<commit_message>
tweak wording on one slide
</commit_message>
<xml_diff>
--- a/HappinessRetirementConundrum.pptx
+++ b/HappinessRetirementConundrum.pptx
@@ -10112,7 +10112,7 @@
         </p:blipFill>
         <p:spPr bwMode="auto">
           <a:xfrm>
-            <a:off x="7737231" y="3505976"/>
+            <a:off x="7728087" y="3505976"/>
             <a:ext cx="4298628" cy="3223972"/>
           </a:xfrm>
           <a:prstGeom prst="rect">
@@ -11810,7 +11810,7 @@
                   <a:srgbClr val="0070C0"/>
                 </a:solidFill>
               </a:rPr>
-              <a:t>Bottom chart represents the Average Overall Happiness to Freedom factor scores for 2022.</a:t>
+              <a:t>Top chart represents the Average Overall Happiness to Freedom factor scores for 2022.</a:t>
             </a:r>
           </a:p>
           <a:p>
@@ -14644,21 +14644,6 @@
 </file>
 
 <file path=customXml/item1.xml><?xml version="1.0" encoding="utf-8"?>
-<?mso-contentType ?>
-<FormTemplates xmlns="http://schemas.microsoft.com/sharepoint/v3/contenttype/forms">
-  <Display>DocumentLibraryForm</Display>
-  <Edit>DocumentLibraryForm</Edit>
-  <New>DocumentLibraryForm</New>
-</FormTemplates>
-</file>
-
-<file path=customXml/item2.xml><?xml version="1.0" encoding="utf-8"?>
-<p:properties xmlns:p="http://schemas.microsoft.com/office/2006/metadata/properties" xmlns:xsi="http://www.w3.org/2001/XMLSchema-instance" xmlns:pc="http://schemas.microsoft.com/office/infopath/2007/PartnerControls">
-  <documentManagement/>
-</p:properties>
-</file>
-
-<file path=customXml/item3.xml><?xml version="1.0" encoding="utf-8"?>
 <ct:contentTypeSchema xmlns:ct="http://schemas.microsoft.com/office/2006/metadata/contentType" xmlns:ma="http://schemas.microsoft.com/office/2006/metadata/properties/metaAttributes" ct:_="" ma:_="" ma:contentTypeName="Document" ma:contentTypeID="0x01010022E97965CEF07F4BB0DD4FFED26FBEBA" ma:contentTypeVersion="2" ma:contentTypeDescription="Create a new document." ma:contentTypeScope="" ma:versionID="ee461658e23f52c8a6140612ac783eb1">
   <xsd:schema xmlns:xsd="http://www.w3.org/2001/XMLSchema" xmlns:xs="http://www.w3.org/2001/XMLSchema" xmlns:p="http://schemas.microsoft.com/office/2006/metadata/properties" xmlns:ns3="197ba2cb-a464-46ea-9159-3cb22f4b1dd5" targetNamespace="http://schemas.microsoft.com/office/2006/metadata/properties" ma:root="true" ma:fieldsID="9d46c490d83f5d9adae20b456ce60064" ns3:_="">
     <xsd:import namespace="197ba2cb-a464-46ea-9159-3cb22f4b1dd5"/>
@@ -14790,10 +14775,35 @@
 </ct:contentTypeSchema>
 </file>
 
+<file path=customXml/item2.xml><?xml version="1.0" encoding="utf-8"?>
+<p:properties xmlns:p="http://schemas.microsoft.com/office/2006/metadata/properties" xmlns:xsi="http://www.w3.org/2001/XMLSchema-instance" xmlns:pc="http://schemas.microsoft.com/office/infopath/2007/PartnerControls">
+  <documentManagement/>
+</p:properties>
+</file>
+
+<file path=customXml/item3.xml><?xml version="1.0" encoding="utf-8"?>
+<?mso-contentType ?>
+<FormTemplates xmlns="http://schemas.microsoft.com/sharepoint/v3/contenttype/forms">
+  <Display>DocumentLibraryForm</Display>
+  <Edit>DocumentLibraryForm</Edit>
+  <New>DocumentLibraryForm</New>
+</FormTemplates>
+</file>
+
 <file path=customXml/itemProps1.xml><?xml version="1.0" encoding="utf-8"?>
-<ds:datastoreItem xmlns:ds="http://schemas.openxmlformats.org/officeDocument/2006/customXml" ds:itemID="{0DFA9DF9-BC4A-4BE5-977C-B18B583190B7}">
+<ds:datastoreItem xmlns:ds="http://schemas.openxmlformats.org/officeDocument/2006/customXml" ds:itemID="{8370DAA8-EA6E-4E3C-9CF9-402B5A935382}">
   <ds:schemaRefs>
-    <ds:schemaRef ds:uri="http://schemas.microsoft.com/sharepoint/v3/contenttype/forms"/>
+    <ds:schemaRef ds:uri="http://schemas.microsoft.com/office/2006/metadata/contentType"/>
+    <ds:schemaRef ds:uri="http://schemas.microsoft.com/office/2006/metadata/properties/metaAttributes"/>
+    <ds:schemaRef ds:uri="http://www.w3.org/2001/XMLSchema"/>
+    <ds:schemaRef ds:uri="http://schemas.microsoft.com/office/2006/metadata/properties"/>
+    <ds:schemaRef ds:uri="197ba2cb-a464-46ea-9159-3cb22f4b1dd5"/>
+    <ds:schemaRef ds:uri="http://schemas.microsoft.com/office/2006/documentManagement/types"/>
+    <ds:schemaRef ds:uri="http://schemas.microsoft.com/office/infopath/2007/PartnerControls"/>
+    <ds:schemaRef ds:uri="http://schemas.openxmlformats.org/package/2006/metadata/core-properties"/>
+    <ds:schemaRef ds:uri="http://purl.org/dc/elements/1.1/"/>
+    <ds:schemaRef ds:uri="http://purl.org/dc/terms/"/>
+    <ds:schemaRef ds:uri="http://schemas.microsoft.com/internal/obd"/>
   </ds:schemaRefs>
 </ds:datastoreItem>
 </file>
@@ -14815,19 +14825,9 @@
 </file>
 
 <file path=customXml/itemProps3.xml><?xml version="1.0" encoding="utf-8"?>
-<ds:datastoreItem xmlns:ds="http://schemas.openxmlformats.org/officeDocument/2006/customXml" ds:itemID="{8370DAA8-EA6E-4E3C-9CF9-402B5A935382}">
+<ds:datastoreItem xmlns:ds="http://schemas.openxmlformats.org/officeDocument/2006/customXml" ds:itemID="{0DFA9DF9-BC4A-4BE5-977C-B18B583190B7}">
   <ds:schemaRefs>
-    <ds:schemaRef ds:uri="http://schemas.microsoft.com/office/2006/metadata/contentType"/>
-    <ds:schemaRef ds:uri="http://schemas.microsoft.com/office/2006/metadata/properties/metaAttributes"/>
-    <ds:schemaRef ds:uri="http://www.w3.org/2001/XMLSchema"/>
-    <ds:schemaRef ds:uri="http://schemas.microsoft.com/office/2006/metadata/properties"/>
-    <ds:schemaRef ds:uri="197ba2cb-a464-46ea-9159-3cb22f4b1dd5"/>
-    <ds:schemaRef ds:uri="http://schemas.microsoft.com/office/2006/documentManagement/types"/>
-    <ds:schemaRef ds:uri="http://schemas.microsoft.com/office/infopath/2007/PartnerControls"/>
-    <ds:schemaRef ds:uri="http://schemas.openxmlformats.org/package/2006/metadata/core-properties"/>
-    <ds:schemaRef ds:uri="http://purl.org/dc/elements/1.1/"/>
-    <ds:schemaRef ds:uri="http://purl.org/dc/terms/"/>
-    <ds:schemaRef ds:uri="http://schemas.microsoft.com/internal/obd"/>
+    <ds:schemaRef ds:uri="http://schemas.microsoft.com/sharepoint/v3/contenttype/forms"/>
   </ds:schemaRefs>
 </ds:datastoreItem>
 </file>
</xml_diff>

<commit_message>
Updating presentation and weatherapp
</commit_message>
<xml_diff>
--- a/HappinessRetirementConundrum.pptx
+++ b/HappinessRetirementConundrum.pptx
@@ -341,7 +341,7 @@
           <a:p>
             <a:fld id="{C485584D-7D79-4248-9986-4CA35242F944}" type="datetimeFigureOut">
               <a:rPr lang="en-US" smtClean="0"/>
-              <a:t>2/14/2023</a:t>
+              <a:t>2/15/2023</a:t>
             </a:fld>
             <a:endParaRPr lang="en-US"/>
           </a:p>
@@ -715,7 +715,7 @@
           <a:p>
             <a:fld id="{C485584D-7D79-4248-9986-4CA35242F944}" type="datetimeFigureOut">
               <a:rPr lang="en-US" smtClean="0"/>
-              <a:t>2/14/2023</a:t>
+              <a:t>2/15/2023</a:t>
             </a:fld>
             <a:endParaRPr lang="en-US"/>
           </a:p>
@@ -925,7 +925,7 @@
           <a:p>
             <a:fld id="{C485584D-7D79-4248-9986-4CA35242F944}" type="datetimeFigureOut">
               <a:rPr lang="en-US" smtClean="0"/>
-              <a:t>2/14/2023</a:t>
+              <a:t>2/15/2023</a:t>
             </a:fld>
             <a:endParaRPr lang="en-US"/>
           </a:p>
@@ -1124,7 +1124,7 @@
           <a:p>
             <a:fld id="{C485584D-7D79-4248-9986-4CA35242F944}" type="datetimeFigureOut">
               <a:rPr lang="en-US" smtClean="0"/>
-              <a:t>2/14/2023</a:t>
+              <a:t>2/15/2023</a:t>
             </a:fld>
             <a:endParaRPr lang="en-US"/>
           </a:p>
@@ -1237,7 +1237,7 @@
           <a:p>
             <a:fld id="{C485584D-7D79-4248-9986-4CA35242F944}" type="datetimeFigureOut">
               <a:rPr lang="en-US" smtClean="0"/>
-              <a:t>2/14/2023</a:t>
+              <a:t>2/15/2023</a:t>
             </a:fld>
             <a:endParaRPr lang="en-US"/>
           </a:p>
@@ -1973,7 +1973,7 @@
           <a:p>
             <a:fld id="{C485584D-7D79-4248-9986-4CA35242F944}" type="datetimeFigureOut">
               <a:rPr lang="en-US" smtClean="0"/>
-              <a:t>2/14/2023</a:t>
+              <a:t>2/15/2023</a:t>
             </a:fld>
             <a:endParaRPr lang="en-US"/>
           </a:p>
@@ -2389,7 +2389,7 @@
           <a:p>
             <a:fld id="{C485584D-7D79-4248-9986-4CA35242F944}" type="datetimeFigureOut">
               <a:rPr lang="en-US" smtClean="0"/>
-              <a:t>2/14/2023</a:t>
+              <a:t>2/15/2023</a:t>
             </a:fld>
             <a:endParaRPr lang="en-US"/>
           </a:p>
@@ -2530,7 +2530,7 @@
           <a:p>
             <a:fld id="{C485584D-7D79-4248-9986-4CA35242F944}" type="datetimeFigureOut">
               <a:rPr lang="en-US" smtClean="0"/>
-              <a:t>2/14/2023</a:t>
+              <a:t>2/15/2023</a:t>
             </a:fld>
             <a:endParaRPr lang="en-US"/>
           </a:p>
@@ -2643,7 +2643,7 @@
           <a:p>
             <a:fld id="{C485584D-7D79-4248-9986-4CA35242F944}" type="datetimeFigureOut">
               <a:rPr lang="en-US" smtClean="0"/>
-              <a:t>2/14/2023</a:t>
+              <a:t>2/15/2023</a:t>
             </a:fld>
             <a:endParaRPr lang="en-US"/>
           </a:p>
@@ -2956,7 +2956,7 @@
           <a:p>
             <a:fld id="{C485584D-7D79-4248-9986-4CA35242F944}" type="datetimeFigureOut">
               <a:rPr lang="en-US" smtClean="0"/>
-              <a:t>2/14/2023</a:t>
+              <a:t>2/15/2023</a:t>
             </a:fld>
             <a:endParaRPr lang="en-US"/>
           </a:p>
@@ -3248,7 +3248,7 @@
           <a:p>
             <a:fld id="{C485584D-7D79-4248-9986-4CA35242F944}" type="datetimeFigureOut">
               <a:rPr lang="en-US" smtClean="0"/>
-              <a:t>2/14/2023</a:t>
+              <a:t>2/15/2023</a:t>
             </a:fld>
             <a:endParaRPr lang="en-US"/>
           </a:p>
@@ -3568,7 +3568,7 @@
           <a:p>
             <a:fld id="{C485584D-7D79-4248-9986-4CA35242F944}" type="datetimeFigureOut">
               <a:rPr lang="en-US" smtClean="0"/>
-              <a:t>2/14/2023</a:t>
+              <a:t>2/15/2023</a:t>
             </a:fld>
             <a:endParaRPr lang="en-US"/>
           </a:p>
@@ -6585,7 +6585,7 @@
                   <a:srgbClr val="002060"/>
                 </a:solidFill>
               </a:rPr>
-              <a:t>Weather in Retirement 2027</a:t>
+              <a:t>Weather as a Factor For 2027 Retirement</a:t>
             </a:r>
           </a:p>
         </p:txBody>
@@ -6908,6 +6908,397 @@
           </p:spPr>
         </p:pic>
       </p:grpSp>
+      <p:pic>
+        <p:nvPicPr>
+          <p:cNvPr id="4" name="Picture 3" descr="Graphical user interface, text&#10;&#10;Description automatically generated">
+            <a:extLst>
+              <a:ext uri="{FF2B5EF4-FFF2-40B4-BE49-F238E27FC236}">
+                <a16:creationId xmlns:a16="http://schemas.microsoft.com/office/drawing/2014/main" id="{8E312DEA-1A25-16B5-5C34-53154A132AF4}"/>
+              </a:ext>
+            </a:extLst>
+          </p:cNvPr>
+          <p:cNvPicPr>
+            <a:picLocks noChangeAspect="1"/>
+          </p:cNvPicPr>
+          <p:nvPr/>
+        </p:nvPicPr>
+        <p:blipFill>
+          <a:blip r:embed="rId3" cstate="print">
+            <a:extLst>
+              <a:ext uri="{28A0092B-C50C-407E-A947-70E740481C1C}">
+                <a14:useLocalDpi xmlns:a14="http://schemas.microsoft.com/office/drawing/2010/main" val="0"/>
+              </a:ext>
+            </a:extLst>
+          </a:blip>
+          <a:stretch>
+            <a:fillRect/>
+          </a:stretch>
+        </p:blipFill>
+        <p:spPr>
+          <a:xfrm>
+            <a:off x="7620000" y="53893"/>
+            <a:ext cx="2149797" cy="1895828"/>
+          </a:xfrm>
+          <a:prstGeom prst="rect">
+            <a:avLst/>
+          </a:prstGeom>
+        </p:spPr>
+      </p:pic>
+      <p:pic>
+        <p:nvPicPr>
+          <p:cNvPr id="9" name="Picture 8" descr="Graphical user interface, text, application&#10;&#10;Description automatically generated">
+            <a:extLst>
+              <a:ext uri="{FF2B5EF4-FFF2-40B4-BE49-F238E27FC236}">
+                <a16:creationId xmlns:a16="http://schemas.microsoft.com/office/drawing/2014/main" id="{A2BED16D-EF57-EC88-922D-B11C00DEAE58}"/>
+              </a:ext>
+            </a:extLst>
+          </p:cNvPr>
+          <p:cNvPicPr>
+            <a:picLocks noChangeAspect="1"/>
+          </p:cNvPicPr>
+          <p:nvPr/>
+        </p:nvPicPr>
+        <p:blipFill>
+          <a:blip r:embed="rId4" cstate="print">
+            <a:extLst>
+              <a:ext uri="{28A0092B-C50C-407E-A947-70E740481C1C}">
+                <a14:useLocalDpi xmlns:a14="http://schemas.microsoft.com/office/drawing/2010/main" val="0"/>
+              </a:ext>
+            </a:extLst>
+          </a:blip>
+          <a:stretch>
+            <a:fillRect/>
+          </a:stretch>
+        </p:blipFill>
+        <p:spPr>
+          <a:xfrm>
+            <a:off x="9908573" y="53894"/>
+            <a:ext cx="2160029" cy="1895827"/>
+          </a:xfrm>
+          <a:prstGeom prst="rect">
+            <a:avLst/>
+          </a:prstGeom>
+        </p:spPr>
+      </p:pic>
+      <p:pic>
+        <p:nvPicPr>
+          <p:cNvPr id="11" name="Picture 10" descr="Text&#10;&#10;Description automatically generated">
+            <a:extLst>
+              <a:ext uri="{FF2B5EF4-FFF2-40B4-BE49-F238E27FC236}">
+                <a16:creationId xmlns:a16="http://schemas.microsoft.com/office/drawing/2014/main" id="{FB7F48BF-2A55-A763-A1BC-97AF053B913E}"/>
+              </a:ext>
+            </a:extLst>
+          </p:cNvPr>
+          <p:cNvPicPr>
+            <a:picLocks noChangeAspect="1"/>
+          </p:cNvPicPr>
+          <p:nvPr/>
+        </p:nvPicPr>
+        <p:blipFill>
+          <a:blip r:embed="rId5" cstate="print">
+            <a:extLst>
+              <a:ext uri="{28A0092B-C50C-407E-A947-70E740481C1C}">
+                <a14:useLocalDpi xmlns:a14="http://schemas.microsoft.com/office/drawing/2010/main" val="0"/>
+              </a:ext>
+            </a:extLst>
+          </a:blip>
+          <a:stretch>
+            <a:fillRect/>
+          </a:stretch>
+        </p:blipFill>
+        <p:spPr>
+          <a:xfrm>
+            <a:off x="7628697" y="2057506"/>
+            <a:ext cx="2141100" cy="1879214"/>
+          </a:xfrm>
+          <a:prstGeom prst="rect">
+            <a:avLst/>
+          </a:prstGeom>
+        </p:spPr>
+      </p:pic>
+      <p:pic>
+        <p:nvPicPr>
+          <p:cNvPr id="13" name="Picture 12" descr="Text&#10;&#10;Description automatically generated with medium confidence">
+            <a:extLst>
+              <a:ext uri="{FF2B5EF4-FFF2-40B4-BE49-F238E27FC236}">
+                <a16:creationId xmlns:a16="http://schemas.microsoft.com/office/drawing/2014/main" id="{8EA7001A-4F07-3269-5B1D-473007275220}"/>
+              </a:ext>
+            </a:extLst>
+          </p:cNvPr>
+          <p:cNvPicPr>
+            <a:picLocks noChangeAspect="1"/>
+          </p:cNvPicPr>
+          <p:nvPr/>
+        </p:nvPicPr>
+        <p:blipFill>
+          <a:blip r:embed="rId6" cstate="print">
+            <a:extLst>
+              <a:ext uri="{28A0092B-C50C-407E-A947-70E740481C1C}">
+                <a14:useLocalDpi xmlns:a14="http://schemas.microsoft.com/office/drawing/2010/main" val="0"/>
+              </a:ext>
+            </a:extLst>
+          </a:blip>
+          <a:stretch>
+            <a:fillRect/>
+          </a:stretch>
+        </p:blipFill>
+        <p:spPr>
+          <a:xfrm>
+            <a:off x="9919058" y="2041360"/>
+            <a:ext cx="2141101" cy="1888998"/>
+          </a:xfrm>
+          <a:prstGeom prst="rect">
+            <a:avLst/>
+          </a:prstGeom>
+        </p:spPr>
+      </p:pic>
+      <p:pic>
+        <p:nvPicPr>
+          <p:cNvPr id="15" name="Picture 14" descr="Graphical user interface, text, application&#10;&#10;Description automatically generated">
+            <a:extLst>
+              <a:ext uri="{FF2B5EF4-FFF2-40B4-BE49-F238E27FC236}">
+                <a16:creationId xmlns:a16="http://schemas.microsoft.com/office/drawing/2014/main" id="{300733E9-70C1-5600-D9E8-7C29756E768B}"/>
+              </a:ext>
+            </a:extLst>
+          </p:cNvPr>
+          <p:cNvPicPr>
+            <a:picLocks noChangeAspect="1"/>
+          </p:cNvPicPr>
+          <p:nvPr/>
+        </p:nvPicPr>
+        <p:blipFill>
+          <a:blip r:embed="rId7">
+            <a:extLst>
+              <a:ext uri="{28A0092B-C50C-407E-A947-70E740481C1C}">
+                <a14:useLocalDpi xmlns:a14="http://schemas.microsoft.com/office/drawing/2010/main" val="0"/>
+              </a:ext>
+            </a:extLst>
+          </a:blip>
+          <a:stretch>
+            <a:fillRect/>
+          </a:stretch>
+        </p:blipFill>
+        <p:spPr>
+          <a:xfrm>
+            <a:off x="8600672" y="4143706"/>
+            <a:ext cx="2781703" cy="2437433"/>
+          </a:xfrm>
+          <a:prstGeom prst="rect">
+            <a:avLst/>
+          </a:prstGeom>
+        </p:spPr>
+      </p:pic>
+      <mc:AlternateContent xmlns:mc="http://schemas.openxmlformats.org/markup-compatibility/2006" xmlns:a14="http://schemas.microsoft.com/office/drawing/2010/main">
+        <mc:Choice Requires="a14">
+          <p:sp>
+            <p:nvSpPr>
+              <p:cNvPr id="16" name="TextBox 15">
+                <a:extLst>
+                  <a:ext uri="{FF2B5EF4-FFF2-40B4-BE49-F238E27FC236}">
+                    <a16:creationId xmlns:a16="http://schemas.microsoft.com/office/drawing/2014/main" id="{007B20C2-7FF1-C669-45B8-58C94783F6CB}"/>
+                  </a:ext>
+                </a:extLst>
+              </p:cNvPr>
+              <p:cNvSpPr txBox="1"/>
+              <p:nvPr/>
+            </p:nvSpPr>
+            <p:spPr>
+              <a:xfrm>
+                <a:off x="356919" y="2716823"/>
+                <a:ext cx="3208241" cy="2677656"/>
+              </a:xfrm>
+              <a:prstGeom prst="rect">
+                <a:avLst/>
+              </a:prstGeom>
+              <a:noFill/>
+            </p:spPr>
+            <p:txBody>
+              <a:bodyPr wrap="square" rtlCol="0">
+                <a:spAutoFit/>
+              </a:bodyPr>
+              <a:lstStyle/>
+              <a:p>
+                <a:r>
+                  <a:rPr lang="en-US" sz="1200" b="1" dirty="0"/>
+                  <a:t>New Zealand</a:t>
+                </a:r>
+              </a:p>
+              <a:p>
+                <a:r>
+                  <a:rPr lang="en-US" sz="1200" dirty="0"/>
+                  <a:t>Temp was checked on 2-15-23 @ 1013 (15 </a:t>
+                </a:r>
+                <a14:m>
+                  <m:oMath xmlns:m="http://schemas.openxmlformats.org/officeDocument/2006/math">
+                    <m:r>
+                      <a:rPr lang="en-US" sz="1200" b="0" i="1" smtClean="0">
+                        <a:latin typeface="Cambria Math" panose="02040503050406030204" pitchFamily="18" charset="0"/>
+                      </a:rPr>
+                      <m:t>°</m:t>
+                    </m:r>
+                    <m:r>
+                      <a:rPr lang="en-US" sz="1200" b="0" i="1" smtClean="0">
+                        <a:latin typeface="Cambria Math" panose="02040503050406030204" pitchFamily="18" charset="0"/>
+                      </a:rPr>
+                      <m:t>𝐶</m:t>
+                    </m:r>
+                    <m:r>
+                      <a:rPr lang="en-US" sz="1200" b="0" i="1" smtClean="0">
+                        <a:latin typeface="Cambria Math" panose="02040503050406030204" pitchFamily="18" charset="0"/>
+                      </a:rPr>
+                      <m:t>)</m:t>
+                    </m:r>
+                  </m:oMath>
+                </a14:m>
+                <a:endParaRPr lang="en-US" sz="1200" dirty="0"/>
+              </a:p>
+              <a:p>
+                <a:r>
+                  <a:rPr lang="en-US" sz="1200" dirty="0"/>
+                  <a:t> </a:t>
+                </a:r>
+              </a:p>
+              <a:p>
+                <a:r>
+                  <a:rPr lang="en-US" sz="1200" b="1" dirty="0"/>
+                  <a:t>Denmark</a:t>
+                </a:r>
+              </a:p>
+              <a:p>
+                <a:r>
+                  <a:rPr lang="en-US" sz="1200" dirty="0"/>
+                  <a:t>Temp was checked on 2-15-23 @ 1017 (17 °C)</a:t>
+                </a:r>
+              </a:p>
+              <a:p>
+                <a:endParaRPr lang="en-US" sz="1200" dirty="0"/>
+              </a:p>
+              <a:p>
+                <a:r>
+                  <a:rPr lang="en-US" sz="1200" b="1" dirty="0"/>
+                  <a:t>Sweden</a:t>
+                </a:r>
+              </a:p>
+              <a:p>
+                <a:r>
+                  <a:rPr lang="en-US" sz="1200" dirty="0"/>
+                  <a:t> Temp was checked on 2-15-23 @ 1014 (-1 °C)</a:t>
+                </a:r>
+              </a:p>
+              <a:p>
+                <a:endParaRPr lang="en-US" sz="1200" dirty="0"/>
+              </a:p>
+              <a:p>
+                <a:r>
+                  <a:rPr lang="en-US" sz="1200" b="1" dirty="0"/>
+                  <a:t>Norway</a:t>
+                </a:r>
+              </a:p>
+              <a:p>
+                <a:r>
+                  <a:rPr lang="en-US" sz="1200" dirty="0"/>
+                  <a:t>Temp was checked on 2-15-23 @ 1015 (4 °C)</a:t>
+                </a:r>
+              </a:p>
+              <a:p>
+                <a:endParaRPr lang="en-US" sz="1200" dirty="0"/>
+              </a:p>
+              <a:p>
+                <a:r>
+                  <a:rPr lang="en-US" sz="1200" b="1" dirty="0"/>
+                  <a:t>Australia</a:t>
+                </a:r>
+              </a:p>
+              <a:p>
+                <a:r>
+                  <a:rPr lang="en-US" sz="1200" dirty="0"/>
+                  <a:t> Temp was checked on 2-15-23 @ 1016 (29 °C)</a:t>
+                </a:r>
+              </a:p>
+            </p:txBody>
+          </p:sp>
+        </mc:Choice>
+        <mc:Fallback xmlns="">
+          <p:sp>
+            <p:nvSpPr>
+              <p:cNvPr id="16" name="TextBox 15">
+                <a:extLst>
+                  <a:ext uri="{FF2B5EF4-FFF2-40B4-BE49-F238E27FC236}">
+                    <a16:creationId xmlns:a16="http://schemas.microsoft.com/office/drawing/2014/main" id="{007B20C2-7FF1-C669-45B8-58C94783F6CB}"/>
+                  </a:ext>
+                </a:extLst>
+              </p:cNvPr>
+              <p:cNvSpPr txBox="1">
+                <a:spLocks noRot="1" noChangeAspect="1" noMove="1" noResize="1" noEditPoints="1" noAdjustHandles="1" noChangeArrowheads="1" noChangeShapeType="1" noTextEdit="1"/>
+              </p:cNvSpPr>
+              <p:nvPr/>
+            </p:nvSpPr>
+            <p:spPr>
+              <a:xfrm>
+                <a:off x="356919" y="2716823"/>
+                <a:ext cx="3208241" cy="2677656"/>
+              </a:xfrm>
+              <a:prstGeom prst="rect">
+                <a:avLst/>
+              </a:prstGeom>
+              <a:blipFill>
+                <a:blip r:embed="rId8"/>
+                <a:stretch>
+                  <a:fillRect l="-190" t="-228" b="-911"/>
+                </a:stretch>
+              </a:blipFill>
+            </p:spPr>
+            <p:txBody>
+              <a:bodyPr/>
+              <a:lstStyle/>
+              <a:p>
+                <a:r>
+                  <a:rPr lang="en-US">
+                    <a:noFill/>
+                  </a:rPr>
+                  <a:t> </a:t>
+                </a:r>
+              </a:p>
+            </p:txBody>
+          </p:sp>
+        </mc:Fallback>
+      </mc:AlternateContent>
+      <p:pic>
+        <p:nvPicPr>
+          <p:cNvPr id="18" name="Picture 17" descr="Table&#10;&#10;Description automatically generated">
+            <a:extLst>
+              <a:ext uri="{FF2B5EF4-FFF2-40B4-BE49-F238E27FC236}">
+                <a16:creationId xmlns:a16="http://schemas.microsoft.com/office/drawing/2014/main" id="{B2B2AC15-51CB-B02B-33F2-AB9C4118BA4A}"/>
+              </a:ext>
+            </a:extLst>
+          </p:cNvPr>
+          <p:cNvPicPr>
+            <a:picLocks noChangeAspect="1"/>
+          </p:cNvPicPr>
+          <p:nvPr/>
+        </p:nvPicPr>
+        <p:blipFill>
+          <a:blip r:embed="rId9">
+            <a:extLst>
+              <a:ext uri="{28A0092B-C50C-407E-A947-70E740481C1C}">
+                <a14:useLocalDpi xmlns:a14="http://schemas.microsoft.com/office/drawing/2010/main" val="0"/>
+              </a:ext>
+            </a:extLst>
+          </a:blip>
+          <a:stretch>
+            <a:fillRect/>
+          </a:stretch>
+        </p:blipFill>
+        <p:spPr>
+          <a:xfrm>
+            <a:off x="3879328" y="2985859"/>
+            <a:ext cx="3097809" cy="2333883"/>
+          </a:xfrm>
+          <a:prstGeom prst="rect">
+            <a:avLst/>
+          </a:prstGeom>
+        </p:spPr>
+      </p:pic>
     </p:spTree>
     <p:extLst>
       <p:ext uri="{BB962C8B-B14F-4D97-AF65-F5344CB8AC3E}">
@@ -7793,50 +8184,13 @@
               <a:buChar char="o"/>
             </a:pPr>
             <a:r>
-              <a:rPr lang="en-US" sz="2400" dirty="0">
+              <a:rPr lang="en-US" sz="1800" dirty="0">
                 <a:solidFill>
                   <a:srgbClr val="0070C0"/>
                 </a:solidFill>
               </a:rPr>
-              <a:t>Which countries are projected to be the best places to live by 2027? </a:t>
+              <a:t>What are the average happiness scores across the years and in what countries? Happiest, middle and least?</a:t>
             </a:r>
-          </a:p>
-          <a:p>
-            <a:pPr lvl="1" indent="0">
-              <a:lnSpc>
-                <a:spcPct val="90000"/>
-              </a:lnSpc>
-              <a:buNone/>
-            </a:pPr>
-            <a:r>
-              <a:rPr lang="en-US" sz="2200" dirty="0">
-                <a:solidFill>
-                  <a:srgbClr val="0070C0"/>
-                </a:solidFill>
-              </a:rPr>
-              <a:t>	</a:t>
-            </a:r>
-            <a:r>
-              <a:rPr lang="en-US" sz="2400" dirty="0">
-                <a:solidFill>
-                  <a:srgbClr val="0070C0"/>
-                </a:solidFill>
-              </a:rPr>
-              <a:t>What factors have the greatest influence?</a:t>
-            </a:r>
-          </a:p>
-          <a:p>
-            <a:pPr lvl="1" indent="0">
-              <a:lnSpc>
-                <a:spcPct val="90000"/>
-              </a:lnSpc>
-              <a:buNone/>
-            </a:pPr>
-            <a:endParaRPr lang="en-US" sz="2400" dirty="0">
-              <a:solidFill>
-                <a:srgbClr val="0070C0"/>
-              </a:solidFill>
-            </a:endParaRPr>
           </a:p>
           <a:p>
             <a:pPr marL="342900" indent="-342900">
@@ -7847,13 +8201,12 @@
               <a:buChar char="o"/>
             </a:pPr>
             <a:r>
-              <a:rPr lang="en-US" sz="2400" b="0" i="0" dirty="0">
+              <a:rPr lang="en-US" sz="1800" dirty="0">
                 <a:solidFill>
                   <a:srgbClr val="0070C0"/>
                 </a:solidFill>
-                <a:effectLst/>
               </a:rPr>
-              <a:t>What are the average happiness scores across the years and the top scores in what countries? </a:t>
+              <a:t>What are the main factors that determine the highest levels of happiness?</a:t>
             </a:r>
           </a:p>
           <a:p>
@@ -7865,19 +8218,13 @@
               <a:buChar char="o"/>
             </a:pPr>
             <a:r>
-              <a:rPr lang="en-US" sz="2400" b="0" i="0" dirty="0">
+              <a:rPr lang="en-US" sz="1800" dirty="0">
                 <a:solidFill>
                   <a:srgbClr val="0070C0"/>
                 </a:solidFill>
-                <a:effectLst/>
               </a:rPr>
-              <a:t>What are the main factors that determine the highest levels of happiness?</a:t>
+              <a:t>Are people happier in the pre or post Covid years?  Why? Why not?</a:t>
             </a:r>
-            <a:endParaRPr lang="en-US" sz="2400" dirty="0">
-              <a:solidFill>
-                <a:srgbClr val="0070C0"/>
-              </a:solidFill>
-            </a:endParaRPr>
           </a:p>
           <a:p>
             <a:pPr marL="342900" indent="-342900">
@@ -7887,11 +8234,48 @@
               <a:buFont typeface="Courier New" panose="02070309020205020404" pitchFamily="49" charset="0"/>
               <a:buChar char="o"/>
             </a:pPr>
-            <a:endParaRPr lang="en-US" sz="2400" dirty="0">
-              <a:solidFill>
-                <a:srgbClr val="0070C0"/>
-              </a:solidFill>
-            </a:endParaRPr>
+            <a:r>
+              <a:rPr lang="en-US" sz="1800" dirty="0">
+                <a:solidFill>
+                  <a:srgbClr val="0070C0"/>
+                </a:solidFill>
+              </a:rPr>
+              <a:t>Which countries will be the best places to live in the next decade and why? </a:t>
+            </a:r>
+          </a:p>
+          <a:p>
+            <a:pPr marL="342900" indent="-342900">
+              <a:lnSpc>
+                <a:spcPct val="90000"/>
+              </a:lnSpc>
+              <a:buFont typeface="Courier New" panose="02070309020205020404" pitchFamily="49" charset="0"/>
+              <a:buChar char="o"/>
+            </a:pPr>
+            <a:r>
+              <a:rPr lang="en-US" sz="1800" dirty="0">
+                <a:solidFill>
+                  <a:srgbClr val="0070C0"/>
+                </a:solidFill>
+              </a:rPr>
+              <a:t> What are the Top 5 places forecasted to retire in 2027? </a:t>
+            </a:r>
+          </a:p>
+          <a:p>
+            <a:pPr marL="342900" indent="-342900">
+              <a:lnSpc>
+                <a:spcPct val="90000"/>
+              </a:lnSpc>
+              <a:buFont typeface="Courier New" panose="02070309020205020404" pitchFamily="49" charset="0"/>
+              <a:buChar char="o"/>
+            </a:pPr>
+            <a:r>
+              <a:rPr lang="en-US" sz="1800" dirty="0">
+                <a:solidFill>
+                  <a:srgbClr val="0070C0"/>
+                </a:solidFill>
+              </a:rPr>
+              <a:t>How can we track weather for the top 5 places to retire? Can we create a weather app and track weather?</a:t>
+            </a:r>
           </a:p>
           <a:p>
             <a:pPr>
@@ -12422,100 +12806,6 @@
           </p:style>
         </p:cxnSp>
       </p:grpSp>
-      <p:pic>
-        <p:nvPicPr>
-          <p:cNvPr id="6146" name="Picture 2">
-            <a:extLst>
-              <a:ext uri="{FF2B5EF4-FFF2-40B4-BE49-F238E27FC236}">
-                <a16:creationId xmlns:a16="http://schemas.microsoft.com/office/drawing/2014/main" id="{0A9CB4A4-8E40-405C-20DC-F142F32F3F66}"/>
-              </a:ext>
-            </a:extLst>
-          </p:cNvPr>
-          <p:cNvPicPr>
-            <a:picLocks noChangeAspect="1" noChangeArrowheads="1"/>
-          </p:cNvPicPr>
-          <p:nvPr/>
-        </p:nvPicPr>
-        <p:blipFill>
-          <a:blip r:embed="rId2">
-            <a:extLst>
-              <a:ext uri="{28A0092B-C50C-407E-A947-70E740481C1C}">
-                <a14:useLocalDpi xmlns:a14="http://schemas.microsoft.com/office/drawing/2010/main" val="0"/>
-              </a:ext>
-            </a:extLst>
-          </a:blip>
-          <a:srcRect/>
-          <a:stretch>
-            <a:fillRect/>
-          </a:stretch>
-        </p:blipFill>
-        <p:spPr bwMode="auto">
-          <a:xfrm>
-            <a:off x="7693569" y="3473378"/>
-            <a:ext cx="4409190" cy="3306892"/>
-          </a:xfrm>
-          <a:prstGeom prst="rect">
-            <a:avLst/>
-          </a:prstGeom>
-          <a:noFill/>
-          <a:extLst>
-            <a:ext uri="{909E8E84-426E-40DD-AFC4-6F175D3DCCD1}">
-              <a14:hiddenFill xmlns:a14="http://schemas.microsoft.com/office/drawing/2010/main">
-                <a:solidFill>
-                  <a:srgbClr val="FFFFFF"/>
-                </a:solidFill>
-              </a14:hiddenFill>
-            </a:ext>
-          </a:extLst>
-        </p:spPr>
-      </p:pic>
-      <p:pic>
-        <p:nvPicPr>
-          <p:cNvPr id="6148" name="Picture 4">
-            <a:extLst>
-              <a:ext uri="{FF2B5EF4-FFF2-40B4-BE49-F238E27FC236}">
-                <a16:creationId xmlns:a16="http://schemas.microsoft.com/office/drawing/2014/main" id="{EE9A2F29-6671-1EDB-1BF4-A0F574DEFC26}"/>
-              </a:ext>
-            </a:extLst>
-          </p:cNvPr>
-          <p:cNvPicPr>
-            <a:picLocks noChangeAspect="1" noChangeArrowheads="1"/>
-          </p:cNvPicPr>
-          <p:nvPr/>
-        </p:nvPicPr>
-        <p:blipFill>
-          <a:blip r:embed="rId3">
-            <a:extLst>
-              <a:ext uri="{28A0092B-C50C-407E-A947-70E740481C1C}">
-                <a14:useLocalDpi xmlns:a14="http://schemas.microsoft.com/office/drawing/2010/main" val="0"/>
-              </a:ext>
-            </a:extLst>
-          </a:blip>
-          <a:srcRect/>
-          <a:stretch>
-            <a:fillRect/>
-          </a:stretch>
-        </p:blipFill>
-        <p:spPr bwMode="auto">
-          <a:xfrm>
-            <a:off x="7700689" y="92288"/>
-            <a:ext cx="4409191" cy="3306894"/>
-          </a:xfrm>
-          <a:prstGeom prst="rect">
-            <a:avLst/>
-          </a:prstGeom>
-          <a:noFill/>
-          <a:extLst>
-            <a:ext uri="{909E8E84-426E-40DD-AFC4-6F175D3DCCD1}">
-              <a14:hiddenFill xmlns:a14="http://schemas.microsoft.com/office/drawing/2010/main">
-                <a:solidFill>
-                  <a:srgbClr val="FFFFFF"/>
-                </a:solidFill>
-              </a14:hiddenFill>
-            </a:ext>
-          </a:extLst>
-        </p:spPr>
-      </p:pic>
       <p:grpSp>
         <p:nvGrpSpPr>
           <p:cNvPr id="3" name="Group 2">
@@ -12551,7 +12841,7 @@
             <p:nvPr/>
           </p:nvPicPr>
           <p:blipFill rotWithShape="1">
-            <a:blip r:embed="rId4"/>
+            <a:blip r:embed="rId2"/>
             <a:srcRect b="1747"/>
             <a:stretch/>
           </p:blipFill>
@@ -12580,7 +12870,7 @@
             <p:nvPr/>
           </p:nvPicPr>
           <p:blipFill rotWithShape="1">
-            <a:blip r:embed="rId4"/>
+            <a:blip r:embed="rId2"/>
             <a:srcRect b="1747"/>
             <a:stretch/>
           </p:blipFill>
@@ -12610,7 +12900,7 @@
           <p:nvPr/>
         </p:nvPicPr>
         <p:blipFill>
-          <a:blip r:embed="rId5"/>
+          <a:blip r:embed="rId3"/>
           <a:stretch>
             <a:fillRect/>
           </a:stretch>
@@ -12648,7 +12938,7 @@
           <p:nvPr/>
         </p:nvPicPr>
         <p:blipFill>
-          <a:blip r:embed="rId6"/>
+          <a:blip r:embed="rId4"/>
           <a:stretch>
             <a:fillRect/>
           </a:stretch>
@@ -12685,8 +12975,8 @@
         </p:nvSpPr>
         <p:spPr>
           <a:xfrm>
-            <a:off x="241719" y="4206309"/>
-            <a:ext cx="7136558" cy="2869066"/>
+            <a:off x="323334" y="4600511"/>
+            <a:ext cx="7136558" cy="2339102"/>
           </a:xfrm>
           <a:prstGeom prst="rect">
             <a:avLst/>
@@ -12704,7 +12994,7 @@
               <a:buChar char="o"/>
             </a:pPr>
             <a:r>
-              <a:rPr lang="en-US" sz="2000" dirty="0">
+              <a:rPr lang="en-US" dirty="0">
                 <a:solidFill>
                   <a:srgbClr val="0070C0"/>
                 </a:solidFill>
@@ -12718,7 +13008,7 @@
               <a:buChar char="o"/>
             </a:pPr>
             <a:r>
-              <a:rPr lang="en-US" sz="2000" dirty="0">
+              <a:rPr lang="en-US" dirty="0">
                 <a:solidFill>
                   <a:srgbClr val="0070C0"/>
                 </a:solidFill>
@@ -12732,7 +13022,7 @@
               <a:buChar char="o"/>
             </a:pPr>
             <a:r>
-              <a:rPr lang="en-US" sz="2000" dirty="0">
+              <a:rPr lang="en-US" dirty="0">
                 <a:solidFill>
                   <a:srgbClr val="0070C0"/>
                 </a:solidFill>
@@ -12746,7 +13036,7 @@
               <a:buChar char="o"/>
             </a:pPr>
             <a:r>
-              <a:rPr lang="en-US" sz="2000" dirty="0">
+              <a:rPr lang="en-US" dirty="0">
                 <a:solidFill>
                   <a:srgbClr val="0070C0"/>
                 </a:solidFill>
@@ -12755,10 +13045,6 @@
             </a:r>
           </a:p>
           <a:p>
-            <a:pPr marL="285750" indent="-285750">
-              <a:buFont typeface="Arial" panose="020B0604020202020204" pitchFamily="34" charset="0"/>
-              <a:buChar char="•"/>
-            </a:pPr>
             <a:endParaRPr lang="en-US" sz="2000" dirty="0"/>
           </a:p>
           <a:p>
@@ -12767,6 +13053,364 @@
               <a:buChar char="•"/>
             </a:pPr>
             <a:endParaRPr lang="en-US" dirty="0"/>
+          </a:p>
+        </p:txBody>
+      </p:sp>
+      <p:pic>
+        <p:nvPicPr>
+          <p:cNvPr id="9" name="Picture 8">
+            <a:extLst>
+              <a:ext uri="{FF2B5EF4-FFF2-40B4-BE49-F238E27FC236}">
+                <a16:creationId xmlns:a16="http://schemas.microsoft.com/office/drawing/2014/main" id="{536F2DD1-9681-C954-3520-1AE8100706FC}"/>
+              </a:ext>
+            </a:extLst>
+          </p:cNvPr>
+          <p:cNvPicPr>
+            <a:picLocks noChangeAspect="1"/>
+          </p:cNvPicPr>
+          <p:nvPr/>
+        </p:nvPicPr>
+        <p:blipFill>
+          <a:blip r:embed="rId5">
+            <a:extLst>
+              <a:ext uri="{28A0092B-C50C-407E-A947-70E740481C1C}">
+                <a14:useLocalDpi xmlns:a14="http://schemas.microsoft.com/office/drawing/2010/main" val="0"/>
+              </a:ext>
+            </a:extLst>
+          </a:blip>
+          <a:stretch>
+            <a:fillRect/>
+          </a:stretch>
+        </p:blipFill>
+        <p:spPr>
+          <a:xfrm>
+            <a:off x="7852310" y="238375"/>
+            <a:ext cx="4254168" cy="3190625"/>
+          </a:xfrm>
+          <a:prstGeom prst="rect">
+            <a:avLst/>
+          </a:prstGeom>
+        </p:spPr>
+      </p:pic>
+      <p:pic>
+        <p:nvPicPr>
+          <p:cNvPr id="12" name="Picture 11" descr="Chart, scatter chart&#10;&#10;Description automatically generated">
+            <a:extLst>
+              <a:ext uri="{FF2B5EF4-FFF2-40B4-BE49-F238E27FC236}">
+                <a16:creationId xmlns:a16="http://schemas.microsoft.com/office/drawing/2014/main" id="{8B16C9FD-F69D-926C-CA16-1FA3E20DA34D}"/>
+              </a:ext>
+            </a:extLst>
+          </p:cNvPr>
+          <p:cNvPicPr>
+            <a:picLocks noChangeAspect="1"/>
+          </p:cNvPicPr>
+          <p:nvPr/>
+        </p:nvPicPr>
+        <p:blipFill>
+          <a:blip r:embed="rId6">
+            <a:extLst>
+              <a:ext uri="{28A0092B-C50C-407E-A947-70E740481C1C}">
+                <a14:useLocalDpi xmlns:a14="http://schemas.microsoft.com/office/drawing/2010/main" val="0"/>
+              </a:ext>
+            </a:extLst>
+          </a:blip>
+          <a:stretch>
+            <a:fillRect/>
+          </a:stretch>
+        </p:blipFill>
+        <p:spPr>
+          <a:xfrm>
+            <a:off x="7896700" y="3528874"/>
+            <a:ext cx="4192021" cy="3144016"/>
+          </a:xfrm>
+          <a:prstGeom prst="rect">
+            <a:avLst/>
+          </a:prstGeom>
+        </p:spPr>
+      </p:pic>
+      <p:sp>
+        <p:nvSpPr>
+          <p:cNvPr id="13" name="TextBox 12">
+            <a:extLst>
+              <a:ext uri="{FF2B5EF4-FFF2-40B4-BE49-F238E27FC236}">
+                <a16:creationId xmlns:a16="http://schemas.microsoft.com/office/drawing/2014/main" id="{2A884C25-DE22-2E06-70ED-EB7F6CF3993B}"/>
+              </a:ext>
+            </a:extLst>
+          </p:cNvPr>
+          <p:cNvSpPr txBox="1"/>
+          <p:nvPr/>
+        </p:nvSpPr>
+        <p:spPr>
+          <a:xfrm>
+            <a:off x="978430" y="8536646"/>
+            <a:ext cx="522166" cy="165452"/>
+          </a:xfrm>
+          <a:prstGeom prst="rect">
+            <a:avLst/>
+          </a:prstGeom>
+          <a:noFill/>
+        </p:spPr>
+        <p:txBody>
+          <a:bodyPr wrap="square" rtlCol="0">
+            <a:spAutoFit/>
+          </a:bodyPr>
+          <a:lstStyle/>
+          <a:p>
+            <a:endParaRPr lang="en-US" sz="1100" dirty="0"/>
+          </a:p>
+        </p:txBody>
+      </p:sp>
+      <p:sp>
+        <p:nvSpPr>
+          <p:cNvPr id="14" name="Rectangle 1">
+            <a:extLst>
+              <a:ext uri="{FF2B5EF4-FFF2-40B4-BE49-F238E27FC236}">
+                <a16:creationId xmlns:a16="http://schemas.microsoft.com/office/drawing/2014/main" id="{A53235E6-13F6-34B6-C431-FB4E8D8A767F}"/>
+              </a:ext>
+            </a:extLst>
+          </p:cNvPr>
+          <p:cNvSpPr>
+            <a:spLocks noChangeArrowheads="1"/>
+          </p:cNvSpPr>
+          <p:nvPr/>
+        </p:nvSpPr>
+        <p:spPr bwMode="auto">
+          <a:xfrm>
+            <a:off x="648070" y="4275647"/>
+            <a:ext cx="2148396" cy="153888"/>
+          </a:xfrm>
+          <a:prstGeom prst="rect">
+            <a:avLst/>
+          </a:prstGeom>
+          <a:solidFill>
+            <a:srgbClr val="FFFFFF"/>
+          </a:solidFill>
+          <a:ln>
+            <a:noFill/>
+          </a:ln>
+          <a:effectLst/>
+          <a:extLst>
+            <a:ext uri="{91240B29-F687-4F45-9708-019B960494DF}">
+              <a14:hiddenLine xmlns:a14="http://schemas.microsoft.com/office/drawing/2010/main" w="9525">
+                <a:solidFill>
+                  <a:schemeClr val="tx1"/>
+                </a:solidFill>
+                <a:miter lim="800000"/>
+                <a:headEnd/>
+                <a:tailEnd/>
+              </a14:hiddenLine>
+            </a:ext>
+            <a:ext uri="{AF507438-7753-43E0-B8FC-AC1667EBCBE1}">
+              <a14:hiddenEffects xmlns:a14="http://schemas.microsoft.com/office/drawing/2010/main">
+                <a:effectLst>
+                  <a:outerShdw dist="35921" dir="2700000" algn="ctr" rotWithShape="0">
+                    <a:schemeClr val="bg2"/>
+                  </a:outerShdw>
+                </a:effectLst>
+              </a14:hiddenEffects>
+            </a:ext>
+          </a:extLst>
+        </p:spPr>
+        <p:txBody>
+          <a:bodyPr vert="horz" wrap="square" lIns="0" tIns="0" rIns="0" bIns="0" numCol="1" anchor="ctr" anchorCtr="0" compatLnSpc="1">
+            <a:prstTxWarp prst="textNoShape">
+              <a:avLst/>
+            </a:prstTxWarp>
+            <a:spAutoFit/>
+          </a:bodyPr>
+          <a:lstStyle/>
+          <a:p>
+            <a:pPr marL="0" marR="0" lvl="0" indent="0" algn="l" defTabSz="914400" rtl="0" eaLnBrk="0" fontAlgn="base" latinLnBrk="0" hangingPunct="0">
+              <a:lnSpc>
+                <a:spcPct val="100000"/>
+              </a:lnSpc>
+              <a:spcBef>
+                <a:spcPct val="0"/>
+              </a:spcBef>
+              <a:spcAft>
+                <a:spcPct val="0"/>
+              </a:spcAft>
+              <a:buClrTx/>
+              <a:buSzTx/>
+              <a:buFontTx/>
+              <a:buNone/>
+              <a:tabLst/>
+            </a:pPr>
+            <a:r>
+              <a:rPr kumimoji="0" lang="en-US" altLang="en-US" sz="1000" b="0" i="0" u="none" strike="noStrike" cap="none" normalizeH="0" baseline="0" dirty="0">
+                <a:ln>
+                  <a:noFill/>
+                </a:ln>
+                <a:solidFill>
+                  <a:schemeClr val="tx1"/>
+                </a:solidFill>
+                <a:effectLst/>
+                <a:latin typeface="Arial Unicode MS"/>
+              </a:rPr>
+              <a:t>The </a:t>
+            </a:r>
+            <a:r>
+              <a:rPr kumimoji="0" lang="en-US" altLang="en-US" sz="1000" b="0" i="0" u="none" strike="noStrike" cap="none" normalizeH="0" baseline="0" dirty="0" err="1">
+                <a:ln>
+                  <a:noFill/>
+                </a:ln>
+                <a:solidFill>
+                  <a:schemeClr val="tx1"/>
+                </a:solidFill>
+                <a:effectLst/>
+                <a:latin typeface="Arial Unicode MS"/>
+              </a:rPr>
+              <a:t>r-value</a:t>
+            </a:r>
+            <a:r>
+              <a:rPr kumimoji="0" lang="en-US" altLang="en-US" sz="1000" b="0" i="0" u="none" strike="noStrike" cap="none" normalizeH="0" baseline="0" dirty="0">
+                <a:ln>
+                  <a:noFill/>
+                </a:ln>
+                <a:solidFill>
+                  <a:schemeClr val="tx1"/>
+                </a:solidFill>
+                <a:effectLst/>
+                <a:latin typeface="Arial Unicode MS"/>
+              </a:rPr>
+              <a:t> is: 0.5852636004828339</a:t>
+            </a:r>
+            <a:r>
+              <a:rPr kumimoji="0" lang="en-US" altLang="en-US" sz="800" b="0" i="0" u="none" strike="noStrike" cap="none" normalizeH="0" baseline="0" dirty="0">
+                <a:ln>
+                  <a:noFill/>
+                </a:ln>
+                <a:solidFill>
+                  <a:schemeClr val="tx1"/>
+                </a:solidFill>
+                <a:effectLst/>
+              </a:rPr>
+              <a:t> </a:t>
+            </a:r>
+            <a:endParaRPr kumimoji="0" lang="en-US" altLang="en-US" sz="1800" b="0" i="0" u="none" strike="noStrike" cap="none" normalizeH="0" baseline="0" dirty="0">
+              <a:ln>
+                <a:noFill/>
+              </a:ln>
+              <a:solidFill>
+                <a:schemeClr val="tx1"/>
+              </a:solidFill>
+              <a:effectLst/>
+              <a:latin typeface="Arial" panose="020B0604020202020204" pitchFamily="34" charset="0"/>
+            </a:endParaRPr>
+          </a:p>
+        </p:txBody>
+      </p:sp>
+      <p:sp>
+        <p:nvSpPr>
+          <p:cNvPr id="17" name="Rectangle 3">
+            <a:extLst>
+              <a:ext uri="{FF2B5EF4-FFF2-40B4-BE49-F238E27FC236}">
+                <a16:creationId xmlns:a16="http://schemas.microsoft.com/office/drawing/2014/main" id="{7F069975-5ED7-6773-3940-335A3D26D1E8}"/>
+              </a:ext>
+            </a:extLst>
+          </p:cNvPr>
+          <p:cNvSpPr>
+            <a:spLocks noChangeArrowheads="1"/>
+          </p:cNvSpPr>
+          <p:nvPr/>
+        </p:nvSpPr>
+        <p:spPr bwMode="auto">
+          <a:xfrm>
+            <a:off x="4483365" y="4268969"/>
+            <a:ext cx="2244571" cy="153888"/>
+          </a:xfrm>
+          <a:prstGeom prst="rect">
+            <a:avLst/>
+          </a:prstGeom>
+          <a:solidFill>
+            <a:srgbClr val="FFFFFF"/>
+          </a:solidFill>
+          <a:ln>
+            <a:noFill/>
+          </a:ln>
+          <a:effectLst/>
+          <a:extLst>
+            <a:ext uri="{91240B29-F687-4F45-9708-019B960494DF}">
+              <a14:hiddenLine xmlns:a14="http://schemas.microsoft.com/office/drawing/2010/main" w="9525">
+                <a:solidFill>
+                  <a:schemeClr val="tx1"/>
+                </a:solidFill>
+                <a:miter lim="800000"/>
+                <a:headEnd/>
+                <a:tailEnd/>
+              </a14:hiddenLine>
+            </a:ext>
+            <a:ext uri="{AF507438-7753-43E0-B8FC-AC1667EBCBE1}">
+              <a14:hiddenEffects xmlns:a14="http://schemas.microsoft.com/office/drawing/2010/main">
+                <a:effectLst>
+                  <a:outerShdw dist="35921" dir="2700000" algn="ctr" rotWithShape="0">
+                    <a:schemeClr val="bg2"/>
+                  </a:outerShdw>
+                </a:effectLst>
+              </a14:hiddenEffects>
+            </a:ext>
+          </a:extLst>
+        </p:spPr>
+        <p:txBody>
+          <a:bodyPr vert="horz" wrap="square" lIns="0" tIns="0" rIns="0" bIns="0" numCol="1" anchor="ctr" anchorCtr="0" compatLnSpc="1">
+            <a:prstTxWarp prst="textNoShape">
+              <a:avLst/>
+            </a:prstTxWarp>
+            <a:spAutoFit/>
+          </a:bodyPr>
+          <a:lstStyle/>
+          <a:p>
+            <a:pPr marL="0" marR="0" lvl="0" indent="0" algn="l" defTabSz="914400" rtl="0" eaLnBrk="0" fontAlgn="base" latinLnBrk="0" hangingPunct="0">
+              <a:lnSpc>
+                <a:spcPct val="100000"/>
+              </a:lnSpc>
+              <a:spcBef>
+                <a:spcPct val="0"/>
+              </a:spcBef>
+              <a:spcAft>
+                <a:spcPct val="0"/>
+              </a:spcAft>
+              <a:buClrTx/>
+              <a:buSzTx/>
+              <a:buFontTx/>
+              <a:buNone/>
+              <a:tabLst/>
+            </a:pPr>
+            <a:r>
+              <a:rPr kumimoji="0" lang="en-US" altLang="en-US" sz="1000" b="0" i="0" u="none" strike="noStrike" cap="none" normalizeH="0" baseline="0">
+                <a:ln>
+                  <a:noFill/>
+                </a:ln>
+                <a:solidFill>
+                  <a:schemeClr val="tx1"/>
+                </a:solidFill>
+                <a:effectLst/>
+                <a:latin typeface="Arial Unicode MS"/>
+              </a:rPr>
+              <a:t>The r-value is: 0.6725286030848764</a:t>
+            </a:r>
+            <a:r>
+              <a:rPr kumimoji="0" lang="en-US" altLang="en-US" sz="800" b="0" i="0" u="none" strike="noStrike" cap="none" normalizeH="0" baseline="0">
+                <a:ln>
+                  <a:noFill/>
+                </a:ln>
+                <a:solidFill>
+                  <a:schemeClr val="tx1"/>
+                </a:solidFill>
+                <a:effectLst/>
+              </a:rPr>
+              <a:t> </a:t>
+            </a:r>
+            <a:endParaRPr kumimoji="0" lang="en-US" altLang="en-US" sz="1800" b="0" i="0" u="none" strike="noStrike" cap="none" normalizeH="0" baseline="0">
+              <a:ln>
+                <a:noFill/>
+              </a:ln>
+              <a:solidFill>
+                <a:schemeClr val="tx1"/>
+              </a:solidFill>
+              <a:effectLst/>
+              <a:latin typeface="Arial" panose="020B0604020202020204" pitchFamily="34" charset="0"/>
+            </a:endParaRPr>
           </a:p>
         </p:txBody>
       </p:sp>

</xml_diff>

<commit_message>
presentation updated by Theresa
</commit_message>
<xml_diff>
--- a/HappinessRetirementConundrum.pptx
+++ b/HappinessRetirementConundrum.pptx
@@ -341,7 +341,7 @@
           <a:p>
             <a:fld id="{C485584D-7D79-4248-9986-4CA35242F944}" type="datetimeFigureOut">
               <a:rPr lang="en-US" smtClean="0"/>
-              <a:t>2/14/2023</a:t>
+              <a:t>2/15/2023</a:t>
             </a:fld>
             <a:endParaRPr lang="en-US"/>
           </a:p>
@@ -715,7 +715,7 @@
           <a:p>
             <a:fld id="{C485584D-7D79-4248-9986-4CA35242F944}" type="datetimeFigureOut">
               <a:rPr lang="en-US" smtClean="0"/>
-              <a:t>2/14/2023</a:t>
+              <a:t>2/15/2023</a:t>
             </a:fld>
             <a:endParaRPr lang="en-US"/>
           </a:p>
@@ -925,7 +925,7 @@
           <a:p>
             <a:fld id="{C485584D-7D79-4248-9986-4CA35242F944}" type="datetimeFigureOut">
               <a:rPr lang="en-US" smtClean="0"/>
-              <a:t>2/14/2023</a:t>
+              <a:t>2/15/2023</a:t>
             </a:fld>
             <a:endParaRPr lang="en-US"/>
           </a:p>
@@ -1124,7 +1124,7 @@
           <a:p>
             <a:fld id="{C485584D-7D79-4248-9986-4CA35242F944}" type="datetimeFigureOut">
               <a:rPr lang="en-US" smtClean="0"/>
-              <a:t>2/14/2023</a:t>
+              <a:t>2/15/2023</a:t>
             </a:fld>
             <a:endParaRPr lang="en-US"/>
           </a:p>
@@ -1237,7 +1237,7 @@
           <a:p>
             <a:fld id="{C485584D-7D79-4248-9986-4CA35242F944}" type="datetimeFigureOut">
               <a:rPr lang="en-US" smtClean="0"/>
-              <a:t>2/14/2023</a:t>
+              <a:t>2/15/2023</a:t>
             </a:fld>
             <a:endParaRPr lang="en-US"/>
           </a:p>
@@ -1973,7 +1973,7 @@
           <a:p>
             <a:fld id="{C485584D-7D79-4248-9986-4CA35242F944}" type="datetimeFigureOut">
               <a:rPr lang="en-US" smtClean="0"/>
-              <a:t>2/14/2023</a:t>
+              <a:t>2/15/2023</a:t>
             </a:fld>
             <a:endParaRPr lang="en-US"/>
           </a:p>
@@ -2389,7 +2389,7 @@
           <a:p>
             <a:fld id="{C485584D-7D79-4248-9986-4CA35242F944}" type="datetimeFigureOut">
               <a:rPr lang="en-US" smtClean="0"/>
-              <a:t>2/14/2023</a:t>
+              <a:t>2/15/2023</a:t>
             </a:fld>
             <a:endParaRPr lang="en-US"/>
           </a:p>
@@ -2530,7 +2530,7 @@
           <a:p>
             <a:fld id="{C485584D-7D79-4248-9986-4CA35242F944}" type="datetimeFigureOut">
               <a:rPr lang="en-US" smtClean="0"/>
-              <a:t>2/14/2023</a:t>
+              <a:t>2/15/2023</a:t>
             </a:fld>
             <a:endParaRPr lang="en-US"/>
           </a:p>
@@ -2643,7 +2643,7 @@
           <a:p>
             <a:fld id="{C485584D-7D79-4248-9986-4CA35242F944}" type="datetimeFigureOut">
               <a:rPr lang="en-US" smtClean="0"/>
-              <a:t>2/14/2023</a:t>
+              <a:t>2/15/2023</a:t>
             </a:fld>
             <a:endParaRPr lang="en-US"/>
           </a:p>
@@ -2956,7 +2956,7 @@
           <a:p>
             <a:fld id="{C485584D-7D79-4248-9986-4CA35242F944}" type="datetimeFigureOut">
               <a:rPr lang="en-US" smtClean="0"/>
-              <a:t>2/14/2023</a:t>
+              <a:t>2/15/2023</a:t>
             </a:fld>
             <a:endParaRPr lang="en-US"/>
           </a:p>
@@ -3248,7 +3248,7 @@
           <a:p>
             <a:fld id="{C485584D-7D79-4248-9986-4CA35242F944}" type="datetimeFigureOut">
               <a:rPr lang="en-US" smtClean="0"/>
-              <a:t>2/14/2023</a:t>
+              <a:t>2/15/2023</a:t>
             </a:fld>
             <a:endParaRPr lang="en-US"/>
           </a:p>
@@ -3568,7 +3568,7 @@
           <a:p>
             <a:fld id="{C485584D-7D79-4248-9986-4CA35242F944}" type="datetimeFigureOut">
               <a:rPr lang="en-US" smtClean="0"/>
-              <a:t>2/14/2023</a:t>
+              <a:t>2/15/2023</a:t>
             </a:fld>
             <a:endParaRPr lang="en-US"/>
           </a:p>
@@ -6585,7 +6585,7 @@
                   <a:srgbClr val="002060"/>
                 </a:solidFill>
               </a:rPr>
-              <a:t>Weather in Retirement 2027</a:t>
+              <a:t>Weather as a Factor For 2027 Retirement</a:t>
             </a:r>
           </a:p>
         </p:txBody>
@@ -6908,6 +6908,397 @@
           </p:spPr>
         </p:pic>
       </p:grpSp>
+      <p:pic>
+        <p:nvPicPr>
+          <p:cNvPr id="4" name="Picture 3" descr="Graphical user interface, text&#10;&#10;Description automatically generated">
+            <a:extLst>
+              <a:ext uri="{FF2B5EF4-FFF2-40B4-BE49-F238E27FC236}">
+                <a16:creationId xmlns:a16="http://schemas.microsoft.com/office/drawing/2014/main" id="{8E312DEA-1A25-16B5-5C34-53154A132AF4}"/>
+              </a:ext>
+            </a:extLst>
+          </p:cNvPr>
+          <p:cNvPicPr>
+            <a:picLocks noChangeAspect="1"/>
+          </p:cNvPicPr>
+          <p:nvPr/>
+        </p:nvPicPr>
+        <p:blipFill>
+          <a:blip r:embed="rId3" cstate="print">
+            <a:extLst>
+              <a:ext uri="{28A0092B-C50C-407E-A947-70E740481C1C}">
+                <a14:useLocalDpi xmlns:a14="http://schemas.microsoft.com/office/drawing/2010/main" val="0"/>
+              </a:ext>
+            </a:extLst>
+          </a:blip>
+          <a:stretch>
+            <a:fillRect/>
+          </a:stretch>
+        </p:blipFill>
+        <p:spPr>
+          <a:xfrm>
+            <a:off x="7620000" y="53893"/>
+            <a:ext cx="2149797" cy="1895828"/>
+          </a:xfrm>
+          <a:prstGeom prst="rect">
+            <a:avLst/>
+          </a:prstGeom>
+        </p:spPr>
+      </p:pic>
+      <p:pic>
+        <p:nvPicPr>
+          <p:cNvPr id="9" name="Picture 8" descr="Graphical user interface, text, application&#10;&#10;Description automatically generated">
+            <a:extLst>
+              <a:ext uri="{FF2B5EF4-FFF2-40B4-BE49-F238E27FC236}">
+                <a16:creationId xmlns:a16="http://schemas.microsoft.com/office/drawing/2014/main" id="{A2BED16D-EF57-EC88-922D-B11C00DEAE58}"/>
+              </a:ext>
+            </a:extLst>
+          </p:cNvPr>
+          <p:cNvPicPr>
+            <a:picLocks noChangeAspect="1"/>
+          </p:cNvPicPr>
+          <p:nvPr/>
+        </p:nvPicPr>
+        <p:blipFill>
+          <a:blip r:embed="rId4" cstate="print">
+            <a:extLst>
+              <a:ext uri="{28A0092B-C50C-407E-A947-70E740481C1C}">
+                <a14:useLocalDpi xmlns:a14="http://schemas.microsoft.com/office/drawing/2010/main" val="0"/>
+              </a:ext>
+            </a:extLst>
+          </a:blip>
+          <a:stretch>
+            <a:fillRect/>
+          </a:stretch>
+        </p:blipFill>
+        <p:spPr>
+          <a:xfrm>
+            <a:off x="9908573" y="53894"/>
+            <a:ext cx="2160029" cy="1895827"/>
+          </a:xfrm>
+          <a:prstGeom prst="rect">
+            <a:avLst/>
+          </a:prstGeom>
+        </p:spPr>
+      </p:pic>
+      <p:pic>
+        <p:nvPicPr>
+          <p:cNvPr id="11" name="Picture 10" descr="Text&#10;&#10;Description automatically generated">
+            <a:extLst>
+              <a:ext uri="{FF2B5EF4-FFF2-40B4-BE49-F238E27FC236}">
+                <a16:creationId xmlns:a16="http://schemas.microsoft.com/office/drawing/2014/main" id="{FB7F48BF-2A55-A763-A1BC-97AF053B913E}"/>
+              </a:ext>
+            </a:extLst>
+          </p:cNvPr>
+          <p:cNvPicPr>
+            <a:picLocks noChangeAspect="1"/>
+          </p:cNvPicPr>
+          <p:nvPr/>
+        </p:nvPicPr>
+        <p:blipFill>
+          <a:blip r:embed="rId5" cstate="print">
+            <a:extLst>
+              <a:ext uri="{28A0092B-C50C-407E-A947-70E740481C1C}">
+                <a14:useLocalDpi xmlns:a14="http://schemas.microsoft.com/office/drawing/2010/main" val="0"/>
+              </a:ext>
+            </a:extLst>
+          </a:blip>
+          <a:stretch>
+            <a:fillRect/>
+          </a:stretch>
+        </p:blipFill>
+        <p:spPr>
+          <a:xfrm>
+            <a:off x="7628697" y="2057506"/>
+            <a:ext cx="2141100" cy="1879214"/>
+          </a:xfrm>
+          <a:prstGeom prst="rect">
+            <a:avLst/>
+          </a:prstGeom>
+        </p:spPr>
+      </p:pic>
+      <p:pic>
+        <p:nvPicPr>
+          <p:cNvPr id="13" name="Picture 12" descr="Text&#10;&#10;Description automatically generated with medium confidence">
+            <a:extLst>
+              <a:ext uri="{FF2B5EF4-FFF2-40B4-BE49-F238E27FC236}">
+                <a16:creationId xmlns:a16="http://schemas.microsoft.com/office/drawing/2014/main" id="{8EA7001A-4F07-3269-5B1D-473007275220}"/>
+              </a:ext>
+            </a:extLst>
+          </p:cNvPr>
+          <p:cNvPicPr>
+            <a:picLocks noChangeAspect="1"/>
+          </p:cNvPicPr>
+          <p:nvPr/>
+        </p:nvPicPr>
+        <p:blipFill>
+          <a:blip r:embed="rId6" cstate="print">
+            <a:extLst>
+              <a:ext uri="{28A0092B-C50C-407E-A947-70E740481C1C}">
+                <a14:useLocalDpi xmlns:a14="http://schemas.microsoft.com/office/drawing/2010/main" val="0"/>
+              </a:ext>
+            </a:extLst>
+          </a:blip>
+          <a:stretch>
+            <a:fillRect/>
+          </a:stretch>
+        </p:blipFill>
+        <p:spPr>
+          <a:xfrm>
+            <a:off x="9919058" y="2041360"/>
+            <a:ext cx="2141101" cy="1888998"/>
+          </a:xfrm>
+          <a:prstGeom prst="rect">
+            <a:avLst/>
+          </a:prstGeom>
+        </p:spPr>
+      </p:pic>
+      <p:pic>
+        <p:nvPicPr>
+          <p:cNvPr id="15" name="Picture 14" descr="Graphical user interface, text, application&#10;&#10;Description automatically generated">
+            <a:extLst>
+              <a:ext uri="{FF2B5EF4-FFF2-40B4-BE49-F238E27FC236}">
+                <a16:creationId xmlns:a16="http://schemas.microsoft.com/office/drawing/2014/main" id="{300733E9-70C1-5600-D9E8-7C29756E768B}"/>
+              </a:ext>
+            </a:extLst>
+          </p:cNvPr>
+          <p:cNvPicPr>
+            <a:picLocks noChangeAspect="1"/>
+          </p:cNvPicPr>
+          <p:nvPr/>
+        </p:nvPicPr>
+        <p:blipFill>
+          <a:blip r:embed="rId7">
+            <a:extLst>
+              <a:ext uri="{28A0092B-C50C-407E-A947-70E740481C1C}">
+                <a14:useLocalDpi xmlns:a14="http://schemas.microsoft.com/office/drawing/2010/main" val="0"/>
+              </a:ext>
+            </a:extLst>
+          </a:blip>
+          <a:stretch>
+            <a:fillRect/>
+          </a:stretch>
+        </p:blipFill>
+        <p:spPr>
+          <a:xfrm>
+            <a:off x="8600672" y="4143706"/>
+            <a:ext cx="2781703" cy="2437433"/>
+          </a:xfrm>
+          <a:prstGeom prst="rect">
+            <a:avLst/>
+          </a:prstGeom>
+        </p:spPr>
+      </p:pic>
+      <mc:AlternateContent xmlns:mc="http://schemas.openxmlformats.org/markup-compatibility/2006" xmlns:a14="http://schemas.microsoft.com/office/drawing/2010/main">
+        <mc:Choice Requires="a14">
+          <p:sp>
+            <p:nvSpPr>
+              <p:cNvPr id="16" name="TextBox 15">
+                <a:extLst>
+                  <a:ext uri="{FF2B5EF4-FFF2-40B4-BE49-F238E27FC236}">
+                    <a16:creationId xmlns:a16="http://schemas.microsoft.com/office/drawing/2014/main" id="{007B20C2-7FF1-C669-45B8-58C94783F6CB}"/>
+                  </a:ext>
+                </a:extLst>
+              </p:cNvPr>
+              <p:cNvSpPr txBox="1"/>
+              <p:nvPr/>
+            </p:nvSpPr>
+            <p:spPr>
+              <a:xfrm>
+                <a:off x="356919" y="2716823"/>
+                <a:ext cx="3208241" cy="2677656"/>
+              </a:xfrm>
+              <a:prstGeom prst="rect">
+                <a:avLst/>
+              </a:prstGeom>
+              <a:noFill/>
+            </p:spPr>
+            <p:txBody>
+              <a:bodyPr wrap="square" rtlCol="0">
+                <a:spAutoFit/>
+              </a:bodyPr>
+              <a:lstStyle/>
+              <a:p>
+                <a:r>
+                  <a:rPr lang="en-US" sz="1200" b="1" dirty="0"/>
+                  <a:t>New Zealand</a:t>
+                </a:r>
+              </a:p>
+              <a:p>
+                <a:r>
+                  <a:rPr lang="en-US" sz="1200" dirty="0"/>
+                  <a:t>Temp was checked on 2-15-23 @ 1013 (15 </a:t>
+                </a:r>
+                <a14:m>
+                  <m:oMath xmlns:m="http://schemas.openxmlformats.org/officeDocument/2006/math">
+                    <m:r>
+                      <a:rPr lang="en-US" sz="1200" b="0" i="1" smtClean="0">
+                        <a:latin typeface="Cambria Math" panose="02040503050406030204" pitchFamily="18" charset="0"/>
+                      </a:rPr>
+                      <m:t>°</m:t>
+                    </m:r>
+                    <m:r>
+                      <a:rPr lang="en-US" sz="1200" b="0" i="1" smtClean="0">
+                        <a:latin typeface="Cambria Math" panose="02040503050406030204" pitchFamily="18" charset="0"/>
+                      </a:rPr>
+                      <m:t>𝐶</m:t>
+                    </m:r>
+                    <m:r>
+                      <a:rPr lang="en-US" sz="1200" b="0" i="1" smtClean="0">
+                        <a:latin typeface="Cambria Math" panose="02040503050406030204" pitchFamily="18" charset="0"/>
+                      </a:rPr>
+                      <m:t>)</m:t>
+                    </m:r>
+                  </m:oMath>
+                </a14:m>
+                <a:endParaRPr lang="en-US" sz="1200" dirty="0"/>
+              </a:p>
+              <a:p>
+                <a:r>
+                  <a:rPr lang="en-US" sz="1200" dirty="0"/>
+                  <a:t> </a:t>
+                </a:r>
+              </a:p>
+              <a:p>
+                <a:r>
+                  <a:rPr lang="en-US" sz="1200" b="1" dirty="0"/>
+                  <a:t>Denmark</a:t>
+                </a:r>
+              </a:p>
+              <a:p>
+                <a:r>
+                  <a:rPr lang="en-US" sz="1200" dirty="0"/>
+                  <a:t>Temp was checked on 2-15-23 @ 1017 (17 °C)</a:t>
+                </a:r>
+              </a:p>
+              <a:p>
+                <a:endParaRPr lang="en-US" sz="1200" dirty="0"/>
+              </a:p>
+              <a:p>
+                <a:r>
+                  <a:rPr lang="en-US" sz="1200" b="1" dirty="0"/>
+                  <a:t>Sweden</a:t>
+                </a:r>
+              </a:p>
+              <a:p>
+                <a:r>
+                  <a:rPr lang="en-US" sz="1200" dirty="0"/>
+                  <a:t> Temp was checked on 2-15-23 @ 1014 (-1 °C)</a:t>
+                </a:r>
+              </a:p>
+              <a:p>
+                <a:endParaRPr lang="en-US" sz="1200" dirty="0"/>
+              </a:p>
+              <a:p>
+                <a:r>
+                  <a:rPr lang="en-US" sz="1200" b="1" dirty="0"/>
+                  <a:t>Norway</a:t>
+                </a:r>
+              </a:p>
+              <a:p>
+                <a:r>
+                  <a:rPr lang="en-US" sz="1200" dirty="0"/>
+                  <a:t>Temp was checked on 2-15-23 @ 1015 (4 °C)</a:t>
+                </a:r>
+              </a:p>
+              <a:p>
+                <a:endParaRPr lang="en-US" sz="1200" dirty="0"/>
+              </a:p>
+              <a:p>
+                <a:r>
+                  <a:rPr lang="en-US" sz="1200" b="1" dirty="0"/>
+                  <a:t>Australia</a:t>
+                </a:r>
+              </a:p>
+              <a:p>
+                <a:r>
+                  <a:rPr lang="en-US" sz="1200" dirty="0"/>
+                  <a:t> Temp was checked on 2-15-23 @ 1016 (29 °C)</a:t>
+                </a:r>
+              </a:p>
+            </p:txBody>
+          </p:sp>
+        </mc:Choice>
+        <mc:Fallback xmlns="">
+          <p:sp>
+            <p:nvSpPr>
+              <p:cNvPr id="16" name="TextBox 15">
+                <a:extLst>
+                  <a:ext uri="{FF2B5EF4-FFF2-40B4-BE49-F238E27FC236}">
+                    <a16:creationId xmlns:a16="http://schemas.microsoft.com/office/drawing/2014/main" id="{007B20C2-7FF1-C669-45B8-58C94783F6CB}"/>
+                  </a:ext>
+                </a:extLst>
+              </p:cNvPr>
+              <p:cNvSpPr txBox="1">
+                <a:spLocks noRot="1" noChangeAspect="1" noMove="1" noResize="1" noEditPoints="1" noAdjustHandles="1" noChangeArrowheads="1" noChangeShapeType="1" noTextEdit="1"/>
+              </p:cNvSpPr>
+              <p:nvPr/>
+            </p:nvSpPr>
+            <p:spPr>
+              <a:xfrm>
+                <a:off x="356919" y="2716823"/>
+                <a:ext cx="3208241" cy="2677656"/>
+              </a:xfrm>
+              <a:prstGeom prst="rect">
+                <a:avLst/>
+              </a:prstGeom>
+              <a:blipFill>
+                <a:blip r:embed="rId8"/>
+                <a:stretch>
+                  <a:fillRect l="-190" t="-228" b="-911"/>
+                </a:stretch>
+              </a:blipFill>
+            </p:spPr>
+            <p:txBody>
+              <a:bodyPr/>
+              <a:lstStyle/>
+              <a:p>
+                <a:r>
+                  <a:rPr lang="en-US">
+                    <a:noFill/>
+                  </a:rPr>
+                  <a:t> </a:t>
+                </a:r>
+              </a:p>
+            </p:txBody>
+          </p:sp>
+        </mc:Fallback>
+      </mc:AlternateContent>
+      <p:pic>
+        <p:nvPicPr>
+          <p:cNvPr id="18" name="Picture 17" descr="Table&#10;&#10;Description automatically generated">
+            <a:extLst>
+              <a:ext uri="{FF2B5EF4-FFF2-40B4-BE49-F238E27FC236}">
+                <a16:creationId xmlns:a16="http://schemas.microsoft.com/office/drawing/2014/main" id="{B2B2AC15-51CB-B02B-33F2-AB9C4118BA4A}"/>
+              </a:ext>
+            </a:extLst>
+          </p:cNvPr>
+          <p:cNvPicPr>
+            <a:picLocks noChangeAspect="1"/>
+          </p:cNvPicPr>
+          <p:nvPr/>
+        </p:nvPicPr>
+        <p:blipFill>
+          <a:blip r:embed="rId9">
+            <a:extLst>
+              <a:ext uri="{28A0092B-C50C-407E-A947-70E740481C1C}">
+                <a14:useLocalDpi xmlns:a14="http://schemas.microsoft.com/office/drawing/2010/main" val="0"/>
+              </a:ext>
+            </a:extLst>
+          </a:blip>
+          <a:stretch>
+            <a:fillRect/>
+          </a:stretch>
+        </p:blipFill>
+        <p:spPr>
+          <a:xfrm>
+            <a:off x="3879328" y="2985859"/>
+            <a:ext cx="3097809" cy="2333883"/>
+          </a:xfrm>
+          <a:prstGeom prst="rect">
+            <a:avLst/>
+          </a:prstGeom>
+        </p:spPr>
+      </p:pic>
     </p:spTree>
     <p:extLst>
       <p:ext uri="{BB962C8B-B14F-4D97-AF65-F5344CB8AC3E}">
@@ -7793,50 +8184,13 @@
               <a:buChar char="o"/>
             </a:pPr>
             <a:r>
-              <a:rPr lang="en-US" sz="2400" dirty="0">
+              <a:rPr lang="en-US" sz="1800" dirty="0">
                 <a:solidFill>
                   <a:srgbClr val="0070C0"/>
                 </a:solidFill>
               </a:rPr>
-              <a:t>Which countries are projected to be the best places to live by 2027? </a:t>
+              <a:t>What are the average happiness scores across the years and in what countries? Happiest, middle and least?</a:t>
             </a:r>
-          </a:p>
-          <a:p>
-            <a:pPr lvl="1" indent="0">
-              <a:lnSpc>
-                <a:spcPct val="90000"/>
-              </a:lnSpc>
-              <a:buNone/>
-            </a:pPr>
-            <a:r>
-              <a:rPr lang="en-US" sz="2200" dirty="0">
-                <a:solidFill>
-                  <a:srgbClr val="0070C0"/>
-                </a:solidFill>
-              </a:rPr>
-              <a:t>	</a:t>
-            </a:r>
-            <a:r>
-              <a:rPr lang="en-US" sz="2400" dirty="0">
-                <a:solidFill>
-                  <a:srgbClr val="0070C0"/>
-                </a:solidFill>
-              </a:rPr>
-              <a:t>What factors have the greatest influence?</a:t>
-            </a:r>
-          </a:p>
-          <a:p>
-            <a:pPr lvl="1" indent="0">
-              <a:lnSpc>
-                <a:spcPct val="90000"/>
-              </a:lnSpc>
-              <a:buNone/>
-            </a:pPr>
-            <a:endParaRPr lang="en-US" sz="2400" dirty="0">
-              <a:solidFill>
-                <a:srgbClr val="0070C0"/>
-              </a:solidFill>
-            </a:endParaRPr>
           </a:p>
           <a:p>
             <a:pPr marL="342900" indent="-342900">
@@ -7847,13 +8201,12 @@
               <a:buChar char="o"/>
             </a:pPr>
             <a:r>
-              <a:rPr lang="en-US" sz="2400" b="0" i="0" dirty="0">
+              <a:rPr lang="en-US" sz="1800" dirty="0">
                 <a:solidFill>
                   <a:srgbClr val="0070C0"/>
                 </a:solidFill>
-                <a:effectLst/>
               </a:rPr>
-              <a:t>What are the average happiness scores across the years and the top scores in what countries? </a:t>
+              <a:t>What are the main factors that determine the highest levels of happiness?</a:t>
             </a:r>
           </a:p>
           <a:p>
@@ -7865,19 +8218,13 @@
               <a:buChar char="o"/>
             </a:pPr>
             <a:r>
-              <a:rPr lang="en-US" sz="2400" b="0" i="0" dirty="0">
+              <a:rPr lang="en-US" sz="1800" dirty="0">
                 <a:solidFill>
                   <a:srgbClr val="0070C0"/>
                 </a:solidFill>
-                <a:effectLst/>
               </a:rPr>
-              <a:t>What are the main factors that determine the highest levels of happiness?</a:t>
+              <a:t>Are people happier in the pre or post Covid years?  Why? Why not?</a:t>
             </a:r>
-            <a:endParaRPr lang="en-US" sz="2400" dirty="0">
-              <a:solidFill>
-                <a:srgbClr val="0070C0"/>
-              </a:solidFill>
-            </a:endParaRPr>
           </a:p>
           <a:p>
             <a:pPr marL="342900" indent="-342900">
@@ -7887,11 +8234,48 @@
               <a:buFont typeface="Courier New" panose="02070309020205020404" pitchFamily="49" charset="0"/>
               <a:buChar char="o"/>
             </a:pPr>
-            <a:endParaRPr lang="en-US" sz="2400" dirty="0">
-              <a:solidFill>
-                <a:srgbClr val="0070C0"/>
-              </a:solidFill>
-            </a:endParaRPr>
+            <a:r>
+              <a:rPr lang="en-US" sz="1800" dirty="0">
+                <a:solidFill>
+                  <a:srgbClr val="0070C0"/>
+                </a:solidFill>
+              </a:rPr>
+              <a:t>Which countries will be the best places to live in the next decade and why? </a:t>
+            </a:r>
+          </a:p>
+          <a:p>
+            <a:pPr marL="342900" indent="-342900">
+              <a:lnSpc>
+                <a:spcPct val="90000"/>
+              </a:lnSpc>
+              <a:buFont typeface="Courier New" panose="02070309020205020404" pitchFamily="49" charset="0"/>
+              <a:buChar char="o"/>
+            </a:pPr>
+            <a:r>
+              <a:rPr lang="en-US" sz="1800" dirty="0">
+                <a:solidFill>
+                  <a:srgbClr val="0070C0"/>
+                </a:solidFill>
+              </a:rPr>
+              <a:t> What are the Top 5 places forecasted to retire in 2027? </a:t>
+            </a:r>
+          </a:p>
+          <a:p>
+            <a:pPr marL="342900" indent="-342900">
+              <a:lnSpc>
+                <a:spcPct val="90000"/>
+              </a:lnSpc>
+              <a:buFont typeface="Courier New" panose="02070309020205020404" pitchFamily="49" charset="0"/>
+              <a:buChar char="o"/>
+            </a:pPr>
+            <a:r>
+              <a:rPr lang="en-US" sz="1800" dirty="0">
+                <a:solidFill>
+                  <a:srgbClr val="0070C0"/>
+                </a:solidFill>
+              </a:rPr>
+              <a:t>How can we track weather for the top 5 places to retire? Can we create a weather app and track weather?</a:t>
+            </a:r>
           </a:p>
           <a:p>
             <a:pPr>
@@ -10112,7 +10496,7 @@
         </p:blipFill>
         <p:spPr bwMode="auto">
           <a:xfrm>
-            <a:off x="7728087" y="3505976"/>
+            <a:off x="7737231" y="3505976"/>
             <a:ext cx="4298628" cy="3223972"/>
           </a:xfrm>
           <a:prstGeom prst="rect">
@@ -11810,7 +12194,7 @@
                   <a:srgbClr val="0070C0"/>
                 </a:solidFill>
               </a:rPr>
-              <a:t>Top chart represents the Average Overall Happiness to Freedom factor scores for 2022.</a:t>
+              <a:t>Bottom chart represents the Average Overall Happiness to Freedom factor scores for 2022.</a:t>
             </a:r>
           </a:p>
           <a:p>
@@ -12422,100 +12806,6 @@
           </p:style>
         </p:cxnSp>
       </p:grpSp>
-      <p:pic>
-        <p:nvPicPr>
-          <p:cNvPr id="6146" name="Picture 2">
-            <a:extLst>
-              <a:ext uri="{FF2B5EF4-FFF2-40B4-BE49-F238E27FC236}">
-                <a16:creationId xmlns:a16="http://schemas.microsoft.com/office/drawing/2014/main" id="{0A9CB4A4-8E40-405C-20DC-F142F32F3F66}"/>
-              </a:ext>
-            </a:extLst>
-          </p:cNvPr>
-          <p:cNvPicPr>
-            <a:picLocks noChangeAspect="1" noChangeArrowheads="1"/>
-          </p:cNvPicPr>
-          <p:nvPr/>
-        </p:nvPicPr>
-        <p:blipFill>
-          <a:blip r:embed="rId2">
-            <a:extLst>
-              <a:ext uri="{28A0092B-C50C-407E-A947-70E740481C1C}">
-                <a14:useLocalDpi xmlns:a14="http://schemas.microsoft.com/office/drawing/2010/main" val="0"/>
-              </a:ext>
-            </a:extLst>
-          </a:blip>
-          <a:srcRect/>
-          <a:stretch>
-            <a:fillRect/>
-          </a:stretch>
-        </p:blipFill>
-        <p:spPr bwMode="auto">
-          <a:xfrm>
-            <a:off x="7693569" y="3473378"/>
-            <a:ext cx="4409190" cy="3306892"/>
-          </a:xfrm>
-          <a:prstGeom prst="rect">
-            <a:avLst/>
-          </a:prstGeom>
-          <a:noFill/>
-          <a:extLst>
-            <a:ext uri="{909E8E84-426E-40DD-AFC4-6F175D3DCCD1}">
-              <a14:hiddenFill xmlns:a14="http://schemas.microsoft.com/office/drawing/2010/main">
-                <a:solidFill>
-                  <a:srgbClr val="FFFFFF"/>
-                </a:solidFill>
-              </a14:hiddenFill>
-            </a:ext>
-          </a:extLst>
-        </p:spPr>
-      </p:pic>
-      <p:pic>
-        <p:nvPicPr>
-          <p:cNvPr id="6148" name="Picture 4">
-            <a:extLst>
-              <a:ext uri="{FF2B5EF4-FFF2-40B4-BE49-F238E27FC236}">
-                <a16:creationId xmlns:a16="http://schemas.microsoft.com/office/drawing/2014/main" id="{EE9A2F29-6671-1EDB-1BF4-A0F574DEFC26}"/>
-              </a:ext>
-            </a:extLst>
-          </p:cNvPr>
-          <p:cNvPicPr>
-            <a:picLocks noChangeAspect="1" noChangeArrowheads="1"/>
-          </p:cNvPicPr>
-          <p:nvPr/>
-        </p:nvPicPr>
-        <p:blipFill>
-          <a:blip r:embed="rId3">
-            <a:extLst>
-              <a:ext uri="{28A0092B-C50C-407E-A947-70E740481C1C}">
-                <a14:useLocalDpi xmlns:a14="http://schemas.microsoft.com/office/drawing/2010/main" val="0"/>
-              </a:ext>
-            </a:extLst>
-          </a:blip>
-          <a:srcRect/>
-          <a:stretch>
-            <a:fillRect/>
-          </a:stretch>
-        </p:blipFill>
-        <p:spPr bwMode="auto">
-          <a:xfrm>
-            <a:off x="7700689" y="92288"/>
-            <a:ext cx="4409191" cy="3306894"/>
-          </a:xfrm>
-          <a:prstGeom prst="rect">
-            <a:avLst/>
-          </a:prstGeom>
-          <a:noFill/>
-          <a:extLst>
-            <a:ext uri="{909E8E84-426E-40DD-AFC4-6F175D3DCCD1}">
-              <a14:hiddenFill xmlns:a14="http://schemas.microsoft.com/office/drawing/2010/main">
-                <a:solidFill>
-                  <a:srgbClr val="FFFFFF"/>
-                </a:solidFill>
-              </a14:hiddenFill>
-            </a:ext>
-          </a:extLst>
-        </p:spPr>
-      </p:pic>
       <p:grpSp>
         <p:nvGrpSpPr>
           <p:cNvPr id="3" name="Group 2">
@@ -12551,7 +12841,7 @@
             <p:nvPr/>
           </p:nvPicPr>
           <p:blipFill rotWithShape="1">
-            <a:blip r:embed="rId4"/>
+            <a:blip r:embed="rId2"/>
             <a:srcRect b="1747"/>
             <a:stretch/>
           </p:blipFill>
@@ -12580,7 +12870,7 @@
             <p:nvPr/>
           </p:nvPicPr>
           <p:blipFill rotWithShape="1">
-            <a:blip r:embed="rId4"/>
+            <a:blip r:embed="rId2"/>
             <a:srcRect b="1747"/>
             <a:stretch/>
           </p:blipFill>
@@ -12610,7 +12900,7 @@
           <p:nvPr/>
         </p:nvPicPr>
         <p:blipFill>
-          <a:blip r:embed="rId5"/>
+          <a:blip r:embed="rId3"/>
           <a:stretch>
             <a:fillRect/>
           </a:stretch>
@@ -12648,7 +12938,7 @@
           <p:nvPr/>
         </p:nvPicPr>
         <p:blipFill>
-          <a:blip r:embed="rId6"/>
+          <a:blip r:embed="rId4"/>
           <a:stretch>
             <a:fillRect/>
           </a:stretch>
@@ -12685,8 +12975,8 @@
         </p:nvSpPr>
         <p:spPr>
           <a:xfrm>
-            <a:off x="241719" y="4206309"/>
-            <a:ext cx="7136558" cy="2869066"/>
+            <a:off x="323334" y="4600511"/>
+            <a:ext cx="7136558" cy="2339102"/>
           </a:xfrm>
           <a:prstGeom prst="rect">
             <a:avLst/>
@@ -12704,7 +12994,7 @@
               <a:buChar char="o"/>
             </a:pPr>
             <a:r>
-              <a:rPr lang="en-US" sz="2000" dirty="0">
+              <a:rPr lang="en-US" dirty="0">
                 <a:solidFill>
                   <a:srgbClr val="0070C0"/>
                 </a:solidFill>
@@ -12718,7 +13008,7 @@
               <a:buChar char="o"/>
             </a:pPr>
             <a:r>
-              <a:rPr lang="en-US" sz="2000" dirty="0">
+              <a:rPr lang="en-US" dirty="0">
                 <a:solidFill>
                   <a:srgbClr val="0070C0"/>
                 </a:solidFill>
@@ -12732,7 +13022,7 @@
               <a:buChar char="o"/>
             </a:pPr>
             <a:r>
-              <a:rPr lang="en-US" sz="2000" dirty="0">
+              <a:rPr lang="en-US" dirty="0">
                 <a:solidFill>
                   <a:srgbClr val="0070C0"/>
                 </a:solidFill>
@@ -12746,7 +13036,7 @@
               <a:buChar char="o"/>
             </a:pPr>
             <a:r>
-              <a:rPr lang="en-US" sz="2000" dirty="0">
+              <a:rPr lang="en-US" dirty="0">
                 <a:solidFill>
                   <a:srgbClr val="0070C0"/>
                 </a:solidFill>
@@ -12755,10 +13045,6 @@
             </a:r>
           </a:p>
           <a:p>
-            <a:pPr marL="285750" indent="-285750">
-              <a:buFont typeface="Arial" panose="020B0604020202020204" pitchFamily="34" charset="0"/>
-              <a:buChar char="•"/>
-            </a:pPr>
             <a:endParaRPr lang="en-US" sz="2000" dirty="0"/>
           </a:p>
           <a:p>
@@ -12767,6 +13053,364 @@
               <a:buChar char="•"/>
             </a:pPr>
             <a:endParaRPr lang="en-US" dirty="0"/>
+          </a:p>
+        </p:txBody>
+      </p:sp>
+      <p:pic>
+        <p:nvPicPr>
+          <p:cNvPr id="9" name="Picture 8">
+            <a:extLst>
+              <a:ext uri="{FF2B5EF4-FFF2-40B4-BE49-F238E27FC236}">
+                <a16:creationId xmlns:a16="http://schemas.microsoft.com/office/drawing/2014/main" id="{536F2DD1-9681-C954-3520-1AE8100706FC}"/>
+              </a:ext>
+            </a:extLst>
+          </p:cNvPr>
+          <p:cNvPicPr>
+            <a:picLocks noChangeAspect="1"/>
+          </p:cNvPicPr>
+          <p:nvPr/>
+        </p:nvPicPr>
+        <p:blipFill>
+          <a:blip r:embed="rId5">
+            <a:extLst>
+              <a:ext uri="{28A0092B-C50C-407E-A947-70E740481C1C}">
+                <a14:useLocalDpi xmlns:a14="http://schemas.microsoft.com/office/drawing/2010/main" val="0"/>
+              </a:ext>
+            </a:extLst>
+          </a:blip>
+          <a:stretch>
+            <a:fillRect/>
+          </a:stretch>
+        </p:blipFill>
+        <p:spPr>
+          <a:xfrm>
+            <a:off x="7852310" y="238375"/>
+            <a:ext cx="4254168" cy="3190625"/>
+          </a:xfrm>
+          <a:prstGeom prst="rect">
+            <a:avLst/>
+          </a:prstGeom>
+        </p:spPr>
+      </p:pic>
+      <p:pic>
+        <p:nvPicPr>
+          <p:cNvPr id="12" name="Picture 11" descr="Chart, scatter chart&#10;&#10;Description automatically generated">
+            <a:extLst>
+              <a:ext uri="{FF2B5EF4-FFF2-40B4-BE49-F238E27FC236}">
+                <a16:creationId xmlns:a16="http://schemas.microsoft.com/office/drawing/2014/main" id="{8B16C9FD-F69D-926C-CA16-1FA3E20DA34D}"/>
+              </a:ext>
+            </a:extLst>
+          </p:cNvPr>
+          <p:cNvPicPr>
+            <a:picLocks noChangeAspect="1"/>
+          </p:cNvPicPr>
+          <p:nvPr/>
+        </p:nvPicPr>
+        <p:blipFill>
+          <a:blip r:embed="rId6">
+            <a:extLst>
+              <a:ext uri="{28A0092B-C50C-407E-A947-70E740481C1C}">
+                <a14:useLocalDpi xmlns:a14="http://schemas.microsoft.com/office/drawing/2010/main" val="0"/>
+              </a:ext>
+            </a:extLst>
+          </a:blip>
+          <a:stretch>
+            <a:fillRect/>
+          </a:stretch>
+        </p:blipFill>
+        <p:spPr>
+          <a:xfrm>
+            <a:off x="7896700" y="3528874"/>
+            <a:ext cx="4192021" cy="3144016"/>
+          </a:xfrm>
+          <a:prstGeom prst="rect">
+            <a:avLst/>
+          </a:prstGeom>
+        </p:spPr>
+      </p:pic>
+      <p:sp>
+        <p:nvSpPr>
+          <p:cNvPr id="13" name="TextBox 12">
+            <a:extLst>
+              <a:ext uri="{FF2B5EF4-FFF2-40B4-BE49-F238E27FC236}">
+                <a16:creationId xmlns:a16="http://schemas.microsoft.com/office/drawing/2014/main" id="{2A884C25-DE22-2E06-70ED-EB7F6CF3993B}"/>
+              </a:ext>
+            </a:extLst>
+          </p:cNvPr>
+          <p:cNvSpPr txBox="1"/>
+          <p:nvPr/>
+        </p:nvSpPr>
+        <p:spPr>
+          <a:xfrm>
+            <a:off x="978430" y="8536646"/>
+            <a:ext cx="522166" cy="165452"/>
+          </a:xfrm>
+          <a:prstGeom prst="rect">
+            <a:avLst/>
+          </a:prstGeom>
+          <a:noFill/>
+        </p:spPr>
+        <p:txBody>
+          <a:bodyPr wrap="square" rtlCol="0">
+            <a:spAutoFit/>
+          </a:bodyPr>
+          <a:lstStyle/>
+          <a:p>
+            <a:endParaRPr lang="en-US" sz="1100" dirty="0"/>
+          </a:p>
+        </p:txBody>
+      </p:sp>
+      <p:sp>
+        <p:nvSpPr>
+          <p:cNvPr id="14" name="Rectangle 1">
+            <a:extLst>
+              <a:ext uri="{FF2B5EF4-FFF2-40B4-BE49-F238E27FC236}">
+                <a16:creationId xmlns:a16="http://schemas.microsoft.com/office/drawing/2014/main" id="{A53235E6-13F6-34B6-C431-FB4E8D8A767F}"/>
+              </a:ext>
+            </a:extLst>
+          </p:cNvPr>
+          <p:cNvSpPr>
+            <a:spLocks noChangeArrowheads="1"/>
+          </p:cNvSpPr>
+          <p:nvPr/>
+        </p:nvSpPr>
+        <p:spPr bwMode="auto">
+          <a:xfrm>
+            <a:off x="648070" y="4275647"/>
+            <a:ext cx="2148396" cy="153888"/>
+          </a:xfrm>
+          <a:prstGeom prst="rect">
+            <a:avLst/>
+          </a:prstGeom>
+          <a:solidFill>
+            <a:srgbClr val="FFFFFF"/>
+          </a:solidFill>
+          <a:ln>
+            <a:noFill/>
+          </a:ln>
+          <a:effectLst/>
+          <a:extLst>
+            <a:ext uri="{91240B29-F687-4F45-9708-019B960494DF}">
+              <a14:hiddenLine xmlns:a14="http://schemas.microsoft.com/office/drawing/2010/main" w="9525">
+                <a:solidFill>
+                  <a:schemeClr val="tx1"/>
+                </a:solidFill>
+                <a:miter lim="800000"/>
+                <a:headEnd/>
+                <a:tailEnd/>
+              </a14:hiddenLine>
+            </a:ext>
+            <a:ext uri="{AF507438-7753-43E0-B8FC-AC1667EBCBE1}">
+              <a14:hiddenEffects xmlns:a14="http://schemas.microsoft.com/office/drawing/2010/main">
+                <a:effectLst>
+                  <a:outerShdw dist="35921" dir="2700000" algn="ctr" rotWithShape="0">
+                    <a:schemeClr val="bg2"/>
+                  </a:outerShdw>
+                </a:effectLst>
+              </a14:hiddenEffects>
+            </a:ext>
+          </a:extLst>
+        </p:spPr>
+        <p:txBody>
+          <a:bodyPr vert="horz" wrap="square" lIns="0" tIns="0" rIns="0" bIns="0" numCol="1" anchor="ctr" anchorCtr="0" compatLnSpc="1">
+            <a:prstTxWarp prst="textNoShape">
+              <a:avLst/>
+            </a:prstTxWarp>
+            <a:spAutoFit/>
+          </a:bodyPr>
+          <a:lstStyle/>
+          <a:p>
+            <a:pPr marL="0" marR="0" lvl="0" indent="0" algn="l" defTabSz="914400" rtl="0" eaLnBrk="0" fontAlgn="base" latinLnBrk="0" hangingPunct="0">
+              <a:lnSpc>
+                <a:spcPct val="100000"/>
+              </a:lnSpc>
+              <a:spcBef>
+                <a:spcPct val="0"/>
+              </a:spcBef>
+              <a:spcAft>
+                <a:spcPct val="0"/>
+              </a:spcAft>
+              <a:buClrTx/>
+              <a:buSzTx/>
+              <a:buFontTx/>
+              <a:buNone/>
+              <a:tabLst/>
+            </a:pPr>
+            <a:r>
+              <a:rPr kumimoji="0" lang="en-US" altLang="en-US" sz="1000" b="0" i="0" u="none" strike="noStrike" cap="none" normalizeH="0" baseline="0" dirty="0">
+                <a:ln>
+                  <a:noFill/>
+                </a:ln>
+                <a:solidFill>
+                  <a:schemeClr val="tx1"/>
+                </a:solidFill>
+                <a:effectLst/>
+                <a:latin typeface="Arial Unicode MS"/>
+              </a:rPr>
+              <a:t>The </a:t>
+            </a:r>
+            <a:r>
+              <a:rPr kumimoji="0" lang="en-US" altLang="en-US" sz="1000" b="0" i="0" u="none" strike="noStrike" cap="none" normalizeH="0" baseline="0" dirty="0" err="1">
+                <a:ln>
+                  <a:noFill/>
+                </a:ln>
+                <a:solidFill>
+                  <a:schemeClr val="tx1"/>
+                </a:solidFill>
+                <a:effectLst/>
+                <a:latin typeface="Arial Unicode MS"/>
+              </a:rPr>
+              <a:t>r-value</a:t>
+            </a:r>
+            <a:r>
+              <a:rPr kumimoji="0" lang="en-US" altLang="en-US" sz="1000" b="0" i="0" u="none" strike="noStrike" cap="none" normalizeH="0" baseline="0" dirty="0">
+                <a:ln>
+                  <a:noFill/>
+                </a:ln>
+                <a:solidFill>
+                  <a:schemeClr val="tx1"/>
+                </a:solidFill>
+                <a:effectLst/>
+                <a:latin typeface="Arial Unicode MS"/>
+              </a:rPr>
+              <a:t> is: 0.5852636004828339</a:t>
+            </a:r>
+            <a:r>
+              <a:rPr kumimoji="0" lang="en-US" altLang="en-US" sz="800" b="0" i="0" u="none" strike="noStrike" cap="none" normalizeH="0" baseline="0" dirty="0">
+                <a:ln>
+                  <a:noFill/>
+                </a:ln>
+                <a:solidFill>
+                  <a:schemeClr val="tx1"/>
+                </a:solidFill>
+                <a:effectLst/>
+              </a:rPr>
+              <a:t> </a:t>
+            </a:r>
+            <a:endParaRPr kumimoji="0" lang="en-US" altLang="en-US" sz="1800" b="0" i="0" u="none" strike="noStrike" cap="none" normalizeH="0" baseline="0" dirty="0">
+              <a:ln>
+                <a:noFill/>
+              </a:ln>
+              <a:solidFill>
+                <a:schemeClr val="tx1"/>
+              </a:solidFill>
+              <a:effectLst/>
+              <a:latin typeface="Arial" panose="020B0604020202020204" pitchFamily="34" charset="0"/>
+            </a:endParaRPr>
+          </a:p>
+        </p:txBody>
+      </p:sp>
+      <p:sp>
+        <p:nvSpPr>
+          <p:cNvPr id="17" name="Rectangle 3">
+            <a:extLst>
+              <a:ext uri="{FF2B5EF4-FFF2-40B4-BE49-F238E27FC236}">
+                <a16:creationId xmlns:a16="http://schemas.microsoft.com/office/drawing/2014/main" id="{7F069975-5ED7-6773-3940-335A3D26D1E8}"/>
+              </a:ext>
+            </a:extLst>
+          </p:cNvPr>
+          <p:cNvSpPr>
+            <a:spLocks noChangeArrowheads="1"/>
+          </p:cNvSpPr>
+          <p:nvPr/>
+        </p:nvSpPr>
+        <p:spPr bwMode="auto">
+          <a:xfrm>
+            <a:off x="4483365" y="4268969"/>
+            <a:ext cx="2244571" cy="153888"/>
+          </a:xfrm>
+          <a:prstGeom prst="rect">
+            <a:avLst/>
+          </a:prstGeom>
+          <a:solidFill>
+            <a:srgbClr val="FFFFFF"/>
+          </a:solidFill>
+          <a:ln>
+            <a:noFill/>
+          </a:ln>
+          <a:effectLst/>
+          <a:extLst>
+            <a:ext uri="{91240B29-F687-4F45-9708-019B960494DF}">
+              <a14:hiddenLine xmlns:a14="http://schemas.microsoft.com/office/drawing/2010/main" w="9525">
+                <a:solidFill>
+                  <a:schemeClr val="tx1"/>
+                </a:solidFill>
+                <a:miter lim="800000"/>
+                <a:headEnd/>
+                <a:tailEnd/>
+              </a14:hiddenLine>
+            </a:ext>
+            <a:ext uri="{AF507438-7753-43E0-B8FC-AC1667EBCBE1}">
+              <a14:hiddenEffects xmlns:a14="http://schemas.microsoft.com/office/drawing/2010/main">
+                <a:effectLst>
+                  <a:outerShdw dist="35921" dir="2700000" algn="ctr" rotWithShape="0">
+                    <a:schemeClr val="bg2"/>
+                  </a:outerShdw>
+                </a:effectLst>
+              </a14:hiddenEffects>
+            </a:ext>
+          </a:extLst>
+        </p:spPr>
+        <p:txBody>
+          <a:bodyPr vert="horz" wrap="square" lIns="0" tIns="0" rIns="0" bIns="0" numCol="1" anchor="ctr" anchorCtr="0" compatLnSpc="1">
+            <a:prstTxWarp prst="textNoShape">
+              <a:avLst/>
+            </a:prstTxWarp>
+            <a:spAutoFit/>
+          </a:bodyPr>
+          <a:lstStyle/>
+          <a:p>
+            <a:pPr marL="0" marR="0" lvl="0" indent="0" algn="l" defTabSz="914400" rtl="0" eaLnBrk="0" fontAlgn="base" latinLnBrk="0" hangingPunct="0">
+              <a:lnSpc>
+                <a:spcPct val="100000"/>
+              </a:lnSpc>
+              <a:spcBef>
+                <a:spcPct val="0"/>
+              </a:spcBef>
+              <a:spcAft>
+                <a:spcPct val="0"/>
+              </a:spcAft>
+              <a:buClrTx/>
+              <a:buSzTx/>
+              <a:buFontTx/>
+              <a:buNone/>
+              <a:tabLst/>
+            </a:pPr>
+            <a:r>
+              <a:rPr kumimoji="0" lang="en-US" altLang="en-US" sz="1000" b="0" i="0" u="none" strike="noStrike" cap="none" normalizeH="0" baseline="0">
+                <a:ln>
+                  <a:noFill/>
+                </a:ln>
+                <a:solidFill>
+                  <a:schemeClr val="tx1"/>
+                </a:solidFill>
+                <a:effectLst/>
+                <a:latin typeface="Arial Unicode MS"/>
+              </a:rPr>
+              <a:t>The r-value is: 0.6725286030848764</a:t>
+            </a:r>
+            <a:r>
+              <a:rPr kumimoji="0" lang="en-US" altLang="en-US" sz="800" b="0" i="0" u="none" strike="noStrike" cap="none" normalizeH="0" baseline="0">
+                <a:ln>
+                  <a:noFill/>
+                </a:ln>
+                <a:solidFill>
+                  <a:schemeClr val="tx1"/>
+                </a:solidFill>
+                <a:effectLst/>
+              </a:rPr>
+              <a:t> </a:t>
+            </a:r>
+            <a:endParaRPr kumimoji="0" lang="en-US" altLang="en-US" sz="1800" b="0" i="0" u="none" strike="noStrike" cap="none" normalizeH="0" baseline="0">
+              <a:ln>
+                <a:noFill/>
+              </a:ln>
+              <a:solidFill>
+                <a:schemeClr val="tx1"/>
+              </a:solidFill>
+              <a:effectLst/>
+              <a:latin typeface="Arial" panose="020B0604020202020204" pitchFamily="34" charset="0"/>
+            </a:endParaRPr>
           </a:p>
         </p:txBody>
       </p:sp>
@@ -14644,6 +15288,21 @@
 </file>
 
 <file path=customXml/item1.xml><?xml version="1.0" encoding="utf-8"?>
+<?mso-contentType ?>
+<FormTemplates xmlns="http://schemas.microsoft.com/sharepoint/v3/contenttype/forms">
+  <Display>DocumentLibraryForm</Display>
+  <Edit>DocumentLibraryForm</Edit>
+  <New>DocumentLibraryForm</New>
+</FormTemplates>
+</file>
+
+<file path=customXml/item2.xml><?xml version="1.0" encoding="utf-8"?>
+<p:properties xmlns:p="http://schemas.microsoft.com/office/2006/metadata/properties" xmlns:xsi="http://www.w3.org/2001/XMLSchema-instance" xmlns:pc="http://schemas.microsoft.com/office/infopath/2007/PartnerControls">
+  <documentManagement/>
+</p:properties>
+</file>
+
+<file path=customXml/item3.xml><?xml version="1.0" encoding="utf-8"?>
 <ct:contentTypeSchema xmlns:ct="http://schemas.microsoft.com/office/2006/metadata/contentType" xmlns:ma="http://schemas.microsoft.com/office/2006/metadata/properties/metaAttributes" ct:_="" ma:_="" ma:contentTypeName="Document" ma:contentTypeID="0x01010022E97965CEF07F4BB0DD4FFED26FBEBA" ma:contentTypeVersion="2" ma:contentTypeDescription="Create a new document." ma:contentTypeScope="" ma:versionID="ee461658e23f52c8a6140612ac783eb1">
   <xsd:schema xmlns:xsd="http://www.w3.org/2001/XMLSchema" xmlns:xs="http://www.w3.org/2001/XMLSchema" xmlns:p="http://schemas.microsoft.com/office/2006/metadata/properties" xmlns:ns3="197ba2cb-a464-46ea-9159-3cb22f4b1dd5" targetNamespace="http://schemas.microsoft.com/office/2006/metadata/properties" ma:root="true" ma:fieldsID="9d46c490d83f5d9adae20b456ce60064" ns3:_="">
     <xsd:import namespace="197ba2cb-a464-46ea-9159-3cb22f4b1dd5"/>
@@ -14775,35 +15434,10 @@
 </ct:contentTypeSchema>
 </file>
 
-<file path=customXml/item2.xml><?xml version="1.0" encoding="utf-8"?>
-<p:properties xmlns:p="http://schemas.microsoft.com/office/2006/metadata/properties" xmlns:xsi="http://www.w3.org/2001/XMLSchema-instance" xmlns:pc="http://schemas.microsoft.com/office/infopath/2007/PartnerControls">
-  <documentManagement/>
-</p:properties>
-</file>
-
-<file path=customXml/item3.xml><?xml version="1.0" encoding="utf-8"?>
-<?mso-contentType ?>
-<FormTemplates xmlns="http://schemas.microsoft.com/sharepoint/v3/contenttype/forms">
-  <Display>DocumentLibraryForm</Display>
-  <Edit>DocumentLibraryForm</Edit>
-  <New>DocumentLibraryForm</New>
-</FormTemplates>
-</file>
-
 <file path=customXml/itemProps1.xml><?xml version="1.0" encoding="utf-8"?>
-<ds:datastoreItem xmlns:ds="http://schemas.openxmlformats.org/officeDocument/2006/customXml" ds:itemID="{8370DAA8-EA6E-4E3C-9CF9-402B5A935382}">
+<ds:datastoreItem xmlns:ds="http://schemas.openxmlformats.org/officeDocument/2006/customXml" ds:itemID="{0DFA9DF9-BC4A-4BE5-977C-B18B583190B7}">
   <ds:schemaRefs>
-    <ds:schemaRef ds:uri="http://schemas.microsoft.com/office/2006/metadata/contentType"/>
-    <ds:schemaRef ds:uri="http://schemas.microsoft.com/office/2006/metadata/properties/metaAttributes"/>
-    <ds:schemaRef ds:uri="http://www.w3.org/2001/XMLSchema"/>
-    <ds:schemaRef ds:uri="http://schemas.microsoft.com/office/2006/metadata/properties"/>
-    <ds:schemaRef ds:uri="197ba2cb-a464-46ea-9159-3cb22f4b1dd5"/>
-    <ds:schemaRef ds:uri="http://schemas.microsoft.com/office/2006/documentManagement/types"/>
-    <ds:schemaRef ds:uri="http://schemas.microsoft.com/office/infopath/2007/PartnerControls"/>
-    <ds:schemaRef ds:uri="http://schemas.openxmlformats.org/package/2006/metadata/core-properties"/>
-    <ds:schemaRef ds:uri="http://purl.org/dc/elements/1.1/"/>
-    <ds:schemaRef ds:uri="http://purl.org/dc/terms/"/>
-    <ds:schemaRef ds:uri="http://schemas.microsoft.com/internal/obd"/>
+    <ds:schemaRef ds:uri="http://schemas.microsoft.com/sharepoint/v3/contenttype/forms"/>
   </ds:schemaRefs>
 </ds:datastoreItem>
 </file>
@@ -14825,9 +15459,19 @@
 </file>
 
 <file path=customXml/itemProps3.xml><?xml version="1.0" encoding="utf-8"?>
-<ds:datastoreItem xmlns:ds="http://schemas.openxmlformats.org/officeDocument/2006/customXml" ds:itemID="{0DFA9DF9-BC4A-4BE5-977C-B18B583190B7}">
+<ds:datastoreItem xmlns:ds="http://schemas.openxmlformats.org/officeDocument/2006/customXml" ds:itemID="{8370DAA8-EA6E-4E3C-9CF9-402B5A935382}">
   <ds:schemaRefs>
-    <ds:schemaRef ds:uri="http://schemas.microsoft.com/sharepoint/v3/contenttype/forms"/>
+    <ds:schemaRef ds:uri="http://schemas.microsoft.com/office/2006/metadata/contentType"/>
+    <ds:schemaRef ds:uri="http://schemas.microsoft.com/office/2006/metadata/properties/metaAttributes"/>
+    <ds:schemaRef ds:uri="http://www.w3.org/2001/XMLSchema"/>
+    <ds:schemaRef ds:uri="http://schemas.microsoft.com/office/2006/metadata/properties"/>
+    <ds:schemaRef ds:uri="197ba2cb-a464-46ea-9159-3cb22f4b1dd5"/>
+    <ds:schemaRef ds:uri="http://schemas.microsoft.com/office/2006/documentManagement/types"/>
+    <ds:schemaRef ds:uri="http://schemas.microsoft.com/office/infopath/2007/PartnerControls"/>
+    <ds:schemaRef ds:uri="http://schemas.openxmlformats.org/package/2006/metadata/core-properties"/>
+    <ds:schemaRef ds:uri="http://purl.org/dc/elements/1.1/"/>
+    <ds:schemaRef ds:uri="http://purl.org/dc/terms/"/>
+    <ds:schemaRef ds:uri="http://schemas.microsoft.com/internal/obd"/>
   </ds:schemaRefs>
 </ds:datastoreItem>
 </file>
</xml_diff>